<commit_message>
Update post for presentation
</commit_message>
<xml_diff>
--- a/src/documents/2014/05/maddotnet-ug-presentation/AngularJS.pptx
+++ b/src/documents/2014/05/maddotnet-ug-presentation/AngularJS.pptx
@@ -4,28 +4,32 @@
   <p:sldMasterIdLst>
     <p:sldMasterId id="2147483650" r:id="rId5"/>
     <p:sldMasterId id="2147483648" r:id="rId6"/>
+    <p:sldMasterId id="2147483665" r:id="rId7"/>
   </p:sldMasterIdLst>
   <p:notesMasterIdLst>
-    <p:notesMasterId r:id="rId24"/>
+    <p:notesMasterId r:id="rId28"/>
   </p:notesMasterIdLst>
   <p:sldIdLst>
-    <p:sldId id="260" r:id="rId7"/>
-    <p:sldId id="264" r:id="rId8"/>
-    <p:sldId id="278" r:id="rId9"/>
-    <p:sldId id="265" r:id="rId10"/>
-    <p:sldId id="266" r:id="rId11"/>
-    <p:sldId id="268" r:id="rId12"/>
-    <p:sldId id="269" r:id="rId13"/>
-    <p:sldId id="270" r:id="rId14"/>
-    <p:sldId id="279" r:id="rId15"/>
-    <p:sldId id="272" r:id="rId16"/>
-    <p:sldId id="276" r:id="rId17"/>
-    <p:sldId id="273" r:id="rId18"/>
-    <p:sldId id="280" r:id="rId19"/>
-    <p:sldId id="274" r:id="rId20"/>
-    <p:sldId id="275" r:id="rId21"/>
-    <p:sldId id="267" r:id="rId22"/>
-    <p:sldId id="277" r:id="rId23"/>
+    <p:sldId id="260" r:id="rId8"/>
+    <p:sldId id="264" r:id="rId9"/>
+    <p:sldId id="278" r:id="rId10"/>
+    <p:sldId id="265" r:id="rId11"/>
+    <p:sldId id="266" r:id="rId12"/>
+    <p:sldId id="268" r:id="rId13"/>
+    <p:sldId id="281" r:id="rId14"/>
+    <p:sldId id="269" r:id="rId15"/>
+    <p:sldId id="270" r:id="rId16"/>
+    <p:sldId id="279" r:id="rId17"/>
+    <p:sldId id="272" r:id="rId18"/>
+    <p:sldId id="276" r:id="rId19"/>
+    <p:sldId id="273" r:id="rId20"/>
+    <p:sldId id="280" r:id="rId21"/>
+    <p:sldId id="274" r:id="rId22"/>
+    <p:sldId id="275" r:id="rId23"/>
+    <p:sldId id="282" r:id="rId24"/>
+    <p:sldId id="267" r:id="rId25"/>
+    <p:sldId id="283" r:id="rId26"/>
+    <p:sldId id="277" r:id="rId27"/>
   </p:sldIdLst>
   <p:sldSz cx="9144000" cy="5143500" type="screen16x9"/>
   <p:notesSz cx="7010400" cy="9296400"/>
@@ -225,7 +229,7 @@
           <a:p>
             <a:fld id="{6B25135B-B541-411A-8615-EEF133DB8D97}" type="datetimeFigureOut">
               <a:rPr lang="en-US" smtClean="0"/>
-              <a:t>5/6/2014</a:t>
+              <a:t>5/7/2014</a:t>
             </a:fld>
             <a:endParaRPr lang="en-US"/>
           </a:p>
@@ -756,6 +760,656 @@
 </p:sldLayout>
 </file>
 
+<file path=ppt/slideLayouts/slideLayout10.xml><?xml version="1.0" encoding="utf-8"?>
+<p:sldLayout xmlns:a="http://schemas.openxmlformats.org/drawingml/2006/main" xmlns:r="http://schemas.openxmlformats.org/officeDocument/2006/relationships" xmlns:p="http://schemas.openxmlformats.org/presentationml/2006/main" type="blank" preserve="1">
+  <p:cSld name="Blank">
+    <p:spTree>
+      <p:nvGrpSpPr>
+        <p:cNvPr id="1" name=""/>
+        <p:cNvGrpSpPr/>
+        <p:nvPr/>
+      </p:nvGrpSpPr>
+      <p:grpSpPr>
+        <a:xfrm>
+          <a:off x="0" y="0"/>
+          <a:ext cx="0" cy="0"/>
+          <a:chOff x="0" y="0"/>
+          <a:chExt cx="0" cy="0"/>
+        </a:xfrm>
+      </p:grpSpPr>
+    </p:spTree>
+    <p:extLst>
+      <p:ext uri="{BB962C8B-B14F-4D97-AF65-F5344CB8AC3E}">
+        <p14:creationId xmlns:p14="http://schemas.microsoft.com/office/powerpoint/2010/main" val="1114012299"/>
+      </p:ext>
+    </p:extLst>
+  </p:cSld>
+  <p:clrMapOvr>
+    <a:masterClrMapping/>
+  </p:clrMapOvr>
+</p:sldLayout>
+</file>
+
+<file path=ppt/slideLayouts/slideLayout11.xml><?xml version="1.0" encoding="utf-8"?>
+<p:sldLayout xmlns:a="http://schemas.openxmlformats.org/drawingml/2006/main" xmlns:r="http://schemas.openxmlformats.org/officeDocument/2006/relationships" xmlns:p="http://schemas.openxmlformats.org/presentationml/2006/main" type="objTx" preserve="1">
+  <p:cSld name="Content with Caption">
+    <p:spTree>
+      <p:nvGrpSpPr>
+        <p:cNvPr id="1" name=""/>
+        <p:cNvGrpSpPr/>
+        <p:nvPr/>
+      </p:nvGrpSpPr>
+      <p:grpSpPr>
+        <a:xfrm>
+          <a:off x="0" y="0"/>
+          <a:ext cx="0" cy="0"/>
+          <a:chOff x="0" y="0"/>
+          <a:chExt cx="0" cy="0"/>
+        </a:xfrm>
+      </p:grpSpPr>
+      <p:sp>
+        <p:nvSpPr>
+          <p:cNvPr id="2" name="Title 1"/>
+          <p:cNvSpPr>
+            <a:spLocks noGrp="1"/>
+          </p:cNvSpPr>
+          <p:nvPr>
+            <p:ph type="title"/>
+          </p:nvPr>
+        </p:nvSpPr>
+        <p:spPr>
+          <a:xfrm>
+            <a:off x="629841" y="342900"/>
+            <a:ext cx="2949178" cy="1200150"/>
+          </a:xfrm>
+        </p:spPr>
+        <p:txBody>
+          <a:bodyPr/>
+          <a:lstStyle>
+            <a:lvl1pPr>
+              <a:defRPr sz="1200"/>
+            </a:lvl1pPr>
+          </a:lstStyle>
+          <a:p>
+            <a:r>
+              <a:rPr lang="en-US" smtClean="0"/>
+              <a:t>Click to edit Master title style</a:t>
+            </a:r>
+            <a:endParaRPr lang="en-US"/>
+          </a:p>
+        </p:txBody>
+      </p:sp>
+      <p:sp>
+        <p:nvSpPr>
+          <p:cNvPr id="3" name="Content Placeholder 2"/>
+          <p:cNvSpPr>
+            <a:spLocks noGrp="1"/>
+          </p:cNvSpPr>
+          <p:nvPr>
+            <p:ph idx="1"/>
+          </p:nvPr>
+        </p:nvSpPr>
+        <p:spPr>
+          <a:xfrm>
+            <a:off x="3887391" y="740569"/>
+            <a:ext cx="4629150" cy="3655219"/>
+          </a:xfrm>
+        </p:spPr>
+        <p:txBody>
+          <a:bodyPr/>
+          <a:lstStyle>
+            <a:lvl1pPr>
+              <a:defRPr sz="1200"/>
+            </a:lvl1pPr>
+            <a:lvl2pPr>
+              <a:defRPr sz="1050"/>
+            </a:lvl2pPr>
+            <a:lvl3pPr>
+              <a:defRPr sz="900"/>
+            </a:lvl3pPr>
+            <a:lvl4pPr>
+              <a:defRPr sz="750"/>
+            </a:lvl4pPr>
+            <a:lvl5pPr>
+              <a:defRPr sz="750"/>
+            </a:lvl5pPr>
+            <a:lvl6pPr>
+              <a:defRPr sz="750"/>
+            </a:lvl6pPr>
+            <a:lvl7pPr>
+              <a:defRPr sz="750"/>
+            </a:lvl7pPr>
+            <a:lvl8pPr>
+              <a:defRPr sz="750"/>
+            </a:lvl8pPr>
+            <a:lvl9pPr>
+              <a:defRPr sz="750"/>
+            </a:lvl9pPr>
+          </a:lstStyle>
+          <a:p>
+            <a:pPr lvl="0"/>
+            <a:r>
+              <a:rPr lang="en-US" smtClean="0"/>
+              <a:t>Click to edit Master text styles</a:t>
+            </a:r>
+          </a:p>
+          <a:p>
+            <a:pPr lvl="1"/>
+            <a:r>
+              <a:rPr lang="en-US" smtClean="0"/>
+              <a:t>Second level</a:t>
+            </a:r>
+          </a:p>
+          <a:p>
+            <a:pPr lvl="2"/>
+            <a:r>
+              <a:rPr lang="en-US" smtClean="0"/>
+              <a:t>Third level</a:t>
+            </a:r>
+          </a:p>
+          <a:p>
+            <a:pPr lvl="3"/>
+            <a:r>
+              <a:rPr lang="en-US" smtClean="0"/>
+              <a:t>Fourth level</a:t>
+            </a:r>
+          </a:p>
+          <a:p>
+            <a:pPr lvl="4"/>
+            <a:r>
+              <a:rPr lang="en-US" smtClean="0"/>
+              <a:t>Fifth level</a:t>
+            </a:r>
+            <a:endParaRPr lang="en-US"/>
+          </a:p>
+        </p:txBody>
+      </p:sp>
+      <p:sp>
+        <p:nvSpPr>
+          <p:cNvPr id="4" name="Text Placeholder 3"/>
+          <p:cNvSpPr>
+            <a:spLocks noGrp="1"/>
+          </p:cNvSpPr>
+          <p:nvPr>
+            <p:ph type="body" sz="half" idx="2"/>
+          </p:nvPr>
+        </p:nvSpPr>
+        <p:spPr>
+          <a:xfrm>
+            <a:off x="629841" y="1543050"/>
+            <a:ext cx="2949178" cy="2858691"/>
+          </a:xfrm>
+        </p:spPr>
+        <p:txBody>
+          <a:bodyPr/>
+          <a:lstStyle>
+            <a:lvl1pPr marL="0" indent="0">
+              <a:buNone/>
+              <a:defRPr sz="600"/>
+            </a:lvl1pPr>
+            <a:lvl2pPr marL="171450" indent="0">
+              <a:buNone/>
+              <a:defRPr sz="525"/>
+            </a:lvl2pPr>
+            <a:lvl3pPr marL="342900" indent="0">
+              <a:buNone/>
+              <a:defRPr sz="450"/>
+            </a:lvl3pPr>
+            <a:lvl4pPr marL="514350" indent="0">
+              <a:buNone/>
+              <a:defRPr sz="375"/>
+            </a:lvl4pPr>
+            <a:lvl5pPr marL="685800" indent="0">
+              <a:buNone/>
+              <a:defRPr sz="375"/>
+            </a:lvl5pPr>
+            <a:lvl6pPr marL="857250" indent="0">
+              <a:buNone/>
+              <a:defRPr sz="375"/>
+            </a:lvl6pPr>
+            <a:lvl7pPr marL="1028700" indent="0">
+              <a:buNone/>
+              <a:defRPr sz="375"/>
+            </a:lvl7pPr>
+            <a:lvl8pPr marL="1200150" indent="0">
+              <a:buNone/>
+              <a:defRPr sz="375"/>
+            </a:lvl8pPr>
+            <a:lvl9pPr marL="1371600" indent="0">
+              <a:buNone/>
+              <a:defRPr sz="375"/>
+            </a:lvl9pPr>
+          </a:lstStyle>
+          <a:p>
+            <a:pPr lvl="0"/>
+            <a:r>
+              <a:rPr lang="en-US" smtClean="0"/>
+              <a:t>Click to edit Master text styles</a:t>
+            </a:r>
+          </a:p>
+        </p:txBody>
+      </p:sp>
+    </p:spTree>
+    <p:extLst>
+      <p:ext uri="{BB962C8B-B14F-4D97-AF65-F5344CB8AC3E}">
+        <p14:creationId xmlns:p14="http://schemas.microsoft.com/office/powerpoint/2010/main" val="2992695520"/>
+      </p:ext>
+    </p:extLst>
+  </p:cSld>
+  <p:clrMapOvr>
+    <a:masterClrMapping/>
+  </p:clrMapOvr>
+</p:sldLayout>
+</file>
+
+<file path=ppt/slideLayouts/slideLayout12.xml><?xml version="1.0" encoding="utf-8"?>
+<p:sldLayout xmlns:a="http://schemas.openxmlformats.org/drawingml/2006/main" xmlns:r="http://schemas.openxmlformats.org/officeDocument/2006/relationships" xmlns:p="http://schemas.openxmlformats.org/presentationml/2006/main" type="picTx" preserve="1">
+  <p:cSld name="Picture with Caption">
+    <p:spTree>
+      <p:nvGrpSpPr>
+        <p:cNvPr id="1" name=""/>
+        <p:cNvGrpSpPr/>
+        <p:nvPr/>
+      </p:nvGrpSpPr>
+      <p:grpSpPr>
+        <a:xfrm>
+          <a:off x="0" y="0"/>
+          <a:ext cx="0" cy="0"/>
+          <a:chOff x="0" y="0"/>
+          <a:chExt cx="0" cy="0"/>
+        </a:xfrm>
+      </p:grpSpPr>
+      <p:sp>
+        <p:nvSpPr>
+          <p:cNvPr id="2" name="Title 1"/>
+          <p:cNvSpPr>
+            <a:spLocks noGrp="1"/>
+          </p:cNvSpPr>
+          <p:nvPr>
+            <p:ph type="title"/>
+          </p:nvPr>
+        </p:nvSpPr>
+        <p:spPr>
+          <a:xfrm>
+            <a:off x="629841" y="342900"/>
+            <a:ext cx="2949178" cy="1200150"/>
+          </a:xfrm>
+        </p:spPr>
+        <p:txBody>
+          <a:bodyPr/>
+          <a:lstStyle>
+            <a:lvl1pPr>
+              <a:defRPr sz="1200"/>
+            </a:lvl1pPr>
+          </a:lstStyle>
+          <a:p>
+            <a:r>
+              <a:rPr lang="en-US" smtClean="0"/>
+              <a:t>Click to edit Master title style</a:t>
+            </a:r>
+            <a:endParaRPr lang="en-US"/>
+          </a:p>
+        </p:txBody>
+      </p:sp>
+      <p:sp>
+        <p:nvSpPr>
+          <p:cNvPr id="3" name="Picture Placeholder 2"/>
+          <p:cNvSpPr>
+            <a:spLocks noGrp="1"/>
+          </p:cNvSpPr>
+          <p:nvPr>
+            <p:ph type="pic" idx="1"/>
+          </p:nvPr>
+        </p:nvSpPr>
+        <p:spPr>
+          <a:xfrm>
+            <a:off x="3887391" y="740569"/>
+            <a:ext cx="4629150" cy="3655219"/>
+          </a:xfrm>
+        </p:spPr>
+        <p:txBody>
+          <a:bodyPr/>
+          <a:lstStyle>
+            <a:lvl1pPr marL="0" indent="0">
+              <a:buNone/>
+              <a:defRPr sz="1200"/>
+            </a:lvl1pPr>
+            <a:lvl2pPr marL="171450" indent="0">
+              <a:buNone/>
+              <a:defRPr sz="1050"/>
+            </a:lvl2pPr>
+            <a:lvl3pPr marL="342900" indent="0">
+              <a:buNone/>
+              <a:defRPr sz="900"/>
+            </a:lvl3pPr>
+            <a:lvl4pPr marL="514350" indent="0">
+              <a:buNone/>
+              <a:defRPr sz="750"/>
+            </a:lvl4pPr>
+            <a:lvl5pPr marL="685800" indent="0">
+              <a:buNone/>
+              <a:defRPr sz="750"/>
+            </a:lvl5pPr>
+            <a:lvl6pPr marL="857250" indent="0">
+              <a:buNone/>
+              <a:defRPr sz="750"/>
+            </a:lvl6pPr>
+            <a:lvl7pPr marL="1028700" indent="0">
+              <a:buNone/>
+              <a:defRPr sz="750"/>
+            </a:lvl7pPr>
+            <a:lvl8pPr marL="1200150" indent="0">
+              <a:buNone/>
+              <a:defRPr sz="750"/>
+            </a:lvl8pPr>
+            <a:lvl9pPr marL="1371600" indent="0">
+              <a:buNone/>
+              <a:defRPr sz="750"/>
+            </a:lvl9pPr>
+          </a:lstStyle>
+          <a:p>
+            <a:endParaRPr lang="en-US"/>
+          </a:p>
+        </p:txBody>
+      </p:sp>
+      <p:sp>
+        <p:nvSpPr>
+          <p:cNvPr id="4" name="Text Placeholder 3"/>
+          <p:cNvSpPr>
+            <a:spLocks noGrp="1"/>
+          </p:cNvSpPr>
+          <p:nvPr>
+            <p:ph type="body" sz="half" idx="2"/>
+          </p:nvPr>
+        </p:nvSpPr>
+        <p:spPr>
+          <a:xfrm>
+            <a:off x="629841" y="1543050"/>
+            <a:ext cx="2949178" cy="2858691"/>
+          </a:xfrm>
+        </p:spPr>
+        <p:txBody>
+          <a:bodyPr/>
+          <a:lstStyle>
+            <a:lvl1pPr marL="0" indent="0">
+              <a:buNone/>
+              <a:defRPr sz="600"/>
+            </a:lvl1pPr>
+            <a:lvl2pPr marL="171450" indent="0">
+              <a:buNone/>
+              <a:defRPr sz="525"/>
+            </a:lvl2pPr>
+            <a:lvl3pPr marL="342900" indent="0">
+              <a:buNone/>
+              <a:defRPr sz="450"/>
+            </a:lvl3pPr>
+            <a:lvl4pPr marL="514350" indent="0">
+              <a:buNone/>
+              <a:defRPr sz="375"/>
+            </a:lvl4pPr>
+            <a:lvl5pPr marL="685800" indent="0">
+              <a:buNone/>
+              <a:defRPr sz="375"/>
+            </a:lvl5pPr>
+            <a:lvl6pPr marL="857250" indent="0">
+              <a:buNone/>
+              <a:defRPr sz="375"/>
+            </a:lvl6pPr>
+            <a:lvl7pPr marL="1028700" indent="0">
+              <a:buNone/>
+              <a:defRPr sz="375"/>
+            </a:lvl7pPr>
+            <a:lvl8pPr marL="1200150" indent="0">
+              <a:buNone/>
+              <a:defRPr sz="375"/>
+            </a:lvl8pPr>
+            <a:lvl9pPr marL="1371600" indent="0">
+              <a:buNone/>
+              <a:defRPr sz="375"/>
+            </a:lvl9pPr>
+          </a:lstStyle>
+          <a:p>
+            <a:pPr lvl="0"/>
+            <a:r>
+              <a:rPr lang="en-US" smtClean="0"/>
+              <a:t>Click to edit Master text styles</a:t>
+            </a:r>
+          </a:p>
+        </p:txBody>
+      </p:sp>
+    </p:spTree>
+    <p:extLst>
+      <p:ext uri="{BB962C8B-B14F-4D97-AF65-F5344CB8AC3E}">
+        <p14:creationId xmlns:p14="http://schemas.microsoft.com/office/powerpoint/2010/main" val="1725965188"/>
+      </p:ext>
+    </p:extLst>
+  </p:cSld>
+  <p:clrMapOvr>
+    <a:masterClrMapping/>
+  </p:clrMapOvr>
+</p:sldLayout>
+</file>
+
+<file path=ppt/slideLayouts/slideLayout13.xml><?xml version="1.0" encoding="utf-8"?>
+<p:sldLayout xmlns:a="http://schemas.openxmlformats.org/drawingml/2006/main" xmlns:r="http://schemas.openxmlformats.org/officeDocument/2006/relationships" xmlns:p="http://schemas.openxmlformats.org/presentationml/2006/main" type="vertTx" preserve="1">
+  <p:cSld name="Title and Vertical Text">
+    <p:spTree>
+      <p:nvGrpSpPr>
+        <p:cNvPr id="1" name=""/>
+        <p:cNvGrpSpPr/>
+        <p:nvPr/>
+      </p:nvGrpSpPr>
+      <p:grpSpPr>
+        <a:xfrm>
+          <a:off x="0" y="0"/>
+          <a:ext cx="0" cy="0"/>
+          <a:chOff x="0" y="0"/>
+          <a:chExt cx="0" cy="0"/>
+        </a:xfrm>
+      </p:grpSpPr>
+      <p:sp>
+        <p:nvSpPr>
+          <p:cNvPr id="2" name="Title 1"/>
+          <p:cNvSpPr>
+            <a:spLocks noGrp="1"/>
+          </p:cNvSpPr>
+          <p:nvPr>
+            <p:ph type="title"/>
+          </p:nvPr>
+        </p:nvSpPr>
+        <p:spPr/>
+        <p:txBody>
+          <a:bodyPr/>
+          <a:lstStyle/>
+          <a:p>
+            <a:r>
+              <a:rPr lang="en-US" smtClean="0"/>
+              <a:t>Click to edit Master title style</a:t>
+            </a:r>
+            <a:endParaRPr lang="en-US"/>
+          </a:p>
+        </p:txBody>
+      </p:sp>
+      <p:sp>
+        <p:nvSpPr>
+          <p:cNvPr id="3" name="Vertical Text Placeholder 2"/>
+          <p:cNvSpPr>
+            <a:spLocks noGrp="1"/>
+          </p:cNvSpPr>
+          <p:nvPr>
+            <p:ph type="body" orient="vert" idx="1"/>
+          </p:nvPr>
+        </p:nvSpPr>
+        <p:spPr/>
+        <p:txBody>
+          <a:bodyPr vert="eaVert"/>
+          <a:lstStyle/>
+          <a:p>
+            <a:pPr lvl="0"/>
+            <a:r>
+              <a:rPr lang="en-US" smtClean="0"/>
+              <a:t>Click to edit Master text styles</a:t>
+            </a:r>
+          </a:p>
+          <a:p>
+            <a:pPr lvl="1"/>
+            <a:r>
+              <a:rPr lang="en-US" smtClean="0"/>
+              <a:t>Second level</a:t>
+            </a:r>
+          </a:p>
+          <a:p>
+            <a:pPr lvl="2"/>
+            <a:r>
+              <a:rPr lang="en-US" smtClean="0"/>
+              <a:t>Third level</a:t>
+            </a:r>
+          </a:p>
+          <a:p>
+            <a:pPr lvl="3"/>
+            <a:r>
+              <a:rPr lang="en-US" smtClean="0"/>
+              <a:t>Fourth level</a:t>
+            </a:r>
+          </a:p>
+          <a:p>
+            <a:pPr lvl="4"/>
+            <a:r>
+              <a:rPr lang="en-US" smtClean="0"/>
+              <a:t>Fifth level</a:t>
+            </a:r>
+            <a:endParaRPr lang="en-US"/>
+          </a:p>
+        </p:txBody>
+      </p:sp>
+    </p:spTree>
+    <p:extLst>
+      <p:ext uri="{BB962C8B-B14F-4D97-AF65-F5344CB8AC3E}">
+        <p14:creationId xmlns:p14="http://schemas.microsoft.com/office/powerpoint/2010/main" val="809021048"/>
+      </p:ext>
+    </p:extLst>
+  </p:cSld>
+  <p:clrMapOvr>
+    <a:masterClrMapping/>
+  </p:clrMapOvr>
+</p:sldLayout>
+</file>
+
+<file path=ppt/slideLayouts/slideLayout14.xml><?xml version="1.0" encoding="utf-8"?>
+<p:sldLayout xmlns:a="http://schemas.openxmlformats.org/drawingml/2006/main" xmlns:r="http://schemas.openxmlformats.org/officeDocument/2006/relationships" xmlns:p="http://schemas.openxmlformats.org/presentationml/2006/main" type="vertTitleAndTx" preserve="1">
+  <p:cSld name="Vertical Title and Text">
+    <p:spTree>
+      <p:nvGrpSpPr>
+        <p:cNvPr id="1" name=""/>
+        <p:cNvGrpSpPr/>
+        <p:nvPr/>
+      </p:nvGrpSpPr>
+      <p:grpSpPr>
+        <a:xfrm>
+          <a:off x="0" y="0"/>
+          <a:ext cx="0" cy="0"/>
+          <a:chOff x="0" y="0"/>
+          <a:chExt cx="0" cy="0"/>
+        </a:xfrm>
+      </p:grpSpPr>
+      <p:sp>
+        <p:nvSpPr>
+          <p:cNvPr id="2" name="Vertical Title 1"/>
+          <p:cNvSpPr>
+            <a:spLocks noGrp="1"/>
+          </p:cNvSpPr>
+          <p:nvPr>
+            <p:ph type="title" orient="vert"/>
+          </p:nvPr>
+        </p:nvSpPr>
+        <p:spPr>
+          <a:xfrm>
+            <a:off x="5951935" y="863799"/>
+            <a:ext cx="1379339" cy="2384226"/>
+          </a:xfrm>
+        </p:spPr>
+        <p:txBody>
+          <a:bodyPr vert="eaVert"/>
+          <a:lstStyle/>
+          <a:p>
+            <a:r>
+              <a:rPr lang="en-US" smtClean="0"/>
+              <a:t>Click to edit Master title style</a:t>
+            </a:r>
+            <a:endParaRPr lang="en-US"/>
+          </a:p>
+        </p:txBody>
+      </p:sp>
+      <p:sp>
+        <p:nvSpPr>
+          <p:cNvPr id="3" name="Vertical Text Placeholder 2"/>
+          <p:cNvSpPr>
+            <a:spLocks noGrp="1"/>
+          </p:cNvSpPr>
+          <p:nvPr>
+            <p:ph type="body" orient="vert" idx="1"/>
+          </p:nvPr>
+        </p:nvSpPr>
+        <p:spPr>
+          <a:xfrm>
+            <a:off x="1812727" y="863799"/>
+            <a:ext cx="4082058" cy="2384226"/>
+          </a:xfrm>
+        </p:spPr>
+        <p:txBody>
+          <a:bodyPr vert="eaVert"/>
+          <a:lstStyle/>
+          <a:p>
+            <a:pPr lvl="0"/>
+            <a:r>
+              <a:rPr lang="en-US" smtClean="0"/>
+              <a:t>Click to edit Master text styles</a:t>
+            </a:r>
+          </a:p>
+          <a:p>
+            <a:pPr lvl="1"/>
+            <a:r>
+              <a:rPr lang="en-US" smtClean="0"/>
+              <a:t>Second level</a:t>
+            </a:r>
+          </a:p>
+          <a:p>
+            <a:pPr lvl="2"/>
+            <a:r>
+              <a:rPr lang="en-US" smtClean="0"/>
+              <a:t>Third level</a:t>
+            </a:r>
+          </a:p>
+          <a:p>
+            <a:pPr lvl="3"/>
+            <a:r>
+              <a:rPr lang="en-US" smtClean="0"/>
+              <a:t>Fourth level</a:t>
+            </a:r>
+          </a:p>
+          <a:p>
+            <a:pPr lvl="4"/>
+            <a:r>
+              <a:rPr lang="en-US" smtClean="0"/>
+              <a:t>Fifth level</a:t>
+            </a:r>
+            <a:endParaRPr lang="en-US"/>
+          </a:p>
+        </p:txBody>
+      </p:sp>
+    </p:spTree>
+    <p:extLst>
+      <p:ext uri="{BB962C8B-B14F-4D97-AF65-F5344CB8AC3E}">
+        <p14:creationId xmlns:p14="http://schemas.microsoft.com/office/powerpoint/2010/main" val="237053704"/>
+      </p:ext>
+    </p:extLst>
+  </p:cSld>
+  <p:clrMapOvr>
+    <a:masterClrMapping/>
+  </p:clrMapOvr>
+</p:sldLayout>
+</file>
+
 <file path=ppt/slideLayouts/slideLayout2.xml><?xml version="1.0" encoding="utf-8"?>
 <p:sldLayout xmlns:a="http://schemas.openxmlformats.org/drawingml/2006/main" xmlns:r="http://schemas.openxmlformats.org/officeDocument/2006/relationships" xmlns:p="http://schemas.openxmlformats.org/presentationml/2006/main" preserve="1" userDrawn="1">
   <p:cSld name="Title Slide">
@@ -1153,6 +1807,887 @@
 </p:sldLayout>
 </file>
 
+<file path=ppt/slideLayouts/slideLayout4.xml><?xml version="1.0" encoding="utf-8"?>
+<p:sldLayout xmlns:a="http://schemas.openxmlformats.org/drawingml/2006/main" xmlns:r="http://schemas.openxmlformats.org/officeDocument/2006/relationships" xmlns:p="http://schemas.openxmlformats.org/presentationml/2006/main" type="title" preserve="1">
+  <p:cSld name="Title Slide">
+    <p:spTree>
+      <p:nvGrpSpPr>
+        <p:cNvPr id="1" name=""/>
+        <p:cNvGrpSpPr/>
+        <p:nvPr/>
+      </p:nvGrpSpPr>
+      <p:grpSpPr>
+        <a:xfrm>
+          <a:off x="0" y="0"/>
+          <a:ext cx="0" cy="0"/>
+          <a:chOff x="0" y="0"/>
+          <a:chExt cx="0" cy="0"/>
+        </a:xfrm>
+      </p:grpSpPr>
+      <p:sp>
+        <p:nvSpPr>
+          <p:cNvPr id="2" name="Title 1"/>
+          <p:cNvSpPr>
+            <a:spLocks noGrp="1"/>
+          </p:cNvSpPr>
+          <p:nvPr>
+            <p:ph type="ctrTitle"/>
+          </p:nvPr>
+        </p:nvSpPr>
+        <p:spPr>
+          <a:xfrm>
+            <a:off x="1143000" y="841772"/>
+            <a:ext cx="6858000" cy="1790700"/>
+          </a:xfrm>
+        </p:spPr>
+        <p:txBody>
+          <a:bodyPr/>
+          <a:lstStyle>
+            <a:lvl1pPr algn="ctr">
+              <a:defRPr sz="2250"/>
+            </a:lvl1pPr>
+          </a:lstStyle>
+          <a:p>
+            <a:r>
+              <a:rPr lang="en-US" smtClean="0"/>
+              <a:t>Click to edit Master title style</a:t>
+            </a:r>
+            <a:endParaRPr lang="en-US"/>
+          </a:p>
+        </p:txBody>
+      </p:sp>
+      <p:sp>
+        <p:nvSpPr>
+          <p:cNvPr id="3" name="Subtitle 2"/>
+          <p:cNvSpPr>
+            <a:spLocks noGrp="1"/>
+          </p:cNvSpPr>
+          <p:nvPr>
+            <p:ph type="subTitle" idx="1"/>
+          </p:nvPr>
+        </p:nvSpPr>
+        <p:spPr>
+          <a:xfrm>
+            <a:off x="1143000" y="2701528"/>
+            <a:ext cx="6858000" cy="1241822"/>
+          </a:xfrm>
+        </p:spPr>
+        <p:txBody>
+          <a:bodyPr/>
+          <a:lstStyle>
+            <a:lvl1pPr marL="0" indent="0" algn="ctr">
+              <a:buNone/>
+              <a:defRPr sz="900"/>
+            </a:lvl1pPr>
+            <a:lvl2pPr marL="171450" indent="0" algn="ctr">
+              <a:buNone/>
+              <a:defRPr sz="750"/>
+            </a:lvl2pPr>
+            <a:lvl3pPr marL="342900" indent="0" algn="ctr">
+              <a:buNone/>
+              <a:defRPr sz="675"/>
+            </a:lvl3pPr>
+            <a:lvl4pPr marL="514350" indent="0" algn="ctr">
+              <a:buNone/>
+              <a:defRPr sz="600"/>
+            </a:lvl4pPr>
+            <a:lvl5pPr marL="685800" indent="0" algn="ctr">
+              <a:buNone/>
+              <a:defRPr sz="600"/>
+            </a:lvl5pPr>
+            <a:lvl6pPr marL="857250" indent="0" algn="ctr">
+              <a:buNone/>
+              <a:defRPr sz="600"/>
+            </a:lvl6pPr>
+            <a:lvl7pPr marL="1028700" indent="0" algn="ctr">
+              <a:buNone/>
+              <a:defRPr sz="600"/>
+            </a:lvl7pPr>
+            <a:lvl8pPr marL="1200150" indent="0" algn="ctr">
+              <a:buNone/>
+              <a:defRPr sz="600"/>
+            </a:lvl8pPr>
+            <a:lvl9pPr marL="1371600" indent="0" algn="ctr">
+              <a:buNone/>
+              <a:defRPr sz="600"/>
+            </a:lvl9pPr>
+          </a:lstStyle>
+          <a:p>
+            <a:r>
+              <a:rPr lang="en-US" smtClean="0"/>
+              <a:t>Click to edit Master subtitle style</a:t>
+            </a:r>
+            <a:endParaRPr lang="en-US"/>
+          </a:p>
+        </p:txBody>
+      </p:sp>
+    </p:spTree>
+    <p:extLst>
+      <p:ext uri="{BB962C8B-B14F-4D97-AF65-F5344CB8AC3E}">
+        <p14:creationId xmlns:p14="http://schemas.microsoft.com/office/powerpoint/2010/main" val="2852901558"/>
+      </p:ext>
+    </p:extLst>
+  </p:cSld>
+  <p:clrMapOvr>
+    <a:masterClrMapping/>
+  </p:clrMapOvr>
+</p:sldLayout>
+</file>
+
+<file path=ppt/slideLayouts/slideLayout5.xml><?xml version="1.0" encoding="utf-8"?>
+<p:sldLayout xmlns:a="http://schemas.openxmlformats.org/drawingml/2006/main" xmlns:r="http://schemas.openxmlformats.org/officeDocument/2006/relationships" xmlns:p="http://schemas.openxmlformats.org/presentationml/2006/main" type="obj" preserve="1">
+  <p:cSld name="Title and Content">
+    <p:spTree>
+      <p:nvGrpSpPr>
+        <p:cNvPr id="1" name=""/>
+        <p:cNvGrpSpPr/>
+        <p:nvPr/>
+      </p:nvGrpSpPr>
+      <p:grpSpPr>
+        <a:xfrm>
+          <a:off x="0" y="0"/>
+          <a:ext cx="0" cy="0"/>
+          <a:chOff x="0" y="0"/>
+          <a:chExt cx="0" cy="0"/>
+        </a:xfrm>
+      </p:grpSpPr>
+      <p:sp>
+        <p:nvSpPr>
+          <p:cNvPr id="2" name="Title 1"/>
+          <p:cNvSpPr>
+            <a:spLocks noGrp="1"/>
+          </p:cNvSpPr>
+          <p:nvPr>
+            <p:ph type="title"/>
+          </p:nvPr>
+        </p:nvSpPr>
+        <p:spPr/>
+        <p:txBody>
+          <a:bodyPr/>
+          <a:lstStyle/>
+          <a:p>
+            <a:r>
+              <a:rPr lang="en-US" smtClean="0"/>
+              <a:t>Click to edit Master title style</a:t>
+            </a:r>
+            <a:endParaRPr lang="en-US"/>
+          </a:p>
+        </p:txBody>
+      </p:sp>
+      <p:sp>
+        <p:nvSpPr>
+          <p:cNvPr id="3" name="Content Placeholder 2"/>
+          <p:cNvSpPr>
+            <a:spLocks noGrp="1"/>
+          </p:cNvSpPr>
+          <p:nvPr>
+            <p:ph idx="1"/>
+          </p:nvPr>
+        </p:nvSpPr>
+        <p:spPr/>
+        <p:txBody>
+          <a:bodyPr/>
+          <a:lstStyle/>
+          <a:p>
+            <a:pPr lvl="0"/>
+            <a:r>
+              <a:rPr lang="en-US" smtClean="0"/>
+              <a:t>Click to edit Master text styles</a:t>
+            </a:r>
+          </a:p>
+          <a:p>
+            <a:pPr lvl="1"/>
+            <a:r>
+              <a:rPr lang="en-US" smtClean="0"/>
+              <a:t>Second level</a:t>
+            </a:r>
+          </a:p>
+          <a:p>
+            <a:pPr lvl="2"/>
+            <a:r>
+              <a:rPr lang="en-US" smtClean="0"/>
+              <a:t>Third level</a:t>
+            </a:r>
+          </a:p>
+          <a:p>
+            <a:pPr lvl="3"/>
+            <a:r>
+              <a:rPr lang="en-US" smtClean="0"/>
+              <a:t>Fourth level</a:t>
+            </a:r>
+          </a:p>
+          <a:p>
+            <a:pPr lvl="4"/>
+            <a:r>
+              <a:rPr lang="en-US" smtClean="0"/>
+              <a:t>Fifth level</a:t>
+            </a:r>
+            <a:endParaRPr lang="en-US"/>
+          </a:p>
+        </p:txBody>
+      </p:sp>
+    </p:spTree>
+    <p:extLst>
+      <p:ext uri="{BB962C8B-B14F-4D97-AF65-F5344CB8AC3E}">
+        <p14:creationId xmlns:p14="http://schemas.microsoft.com/office/powerpoint/2010/main" val="2664512349"/>
+      </p:ext>
+    </p:extLst>
+  </p:cSld>
+  <p:clrMapOvr>
+    <a:masterClrMapping/>
+  </p:clrMapOvr>
+</p:sldLayout>
+</file>
+
+<file path=ppt/slideLayouts/slideLayout6.xml><?xml version="1.0" encoding="utf-8"?>
+<p:sldLayout xmlns:a="http://schemas.openxmlformats.org/drawingml/2006/main" xmlns:r="http://schemas.openxmlformats.org/officeDocument/2006/relationships" xmlns:p="http://schemas.openxmlformats.org/presentationml/2006/main" type="secHead" preserve="1">
+  <p:cSld name="Section Header">
+    <p:spTree>
+      <p:nvGrpSpPr>
+        <p:cNvPr id="1" name=""/>
+        <p:cNvGrpSpPr/>
+        <p:nvPr/>
+      </p:nvGrpSpPr>
+      <p:grpSpPr>
+        <a:xfrm>
+          <a:off x="0" y="0"/>
+          <a:ext cx="0" cy="0"/>
+          <a:chOff x="0" y="0"/>
+          <a:chExt cx="0" cy="0"/>
+        </a:xfrm>
+      </p:grpSpPr>
+      <p:sp>
+        <p:nvSpPr>
+          <p:cNvPr id="2" name="Title 1"/>
+          <p:cNvSpPr>
+            <a:spLocks noGrp="1"/>
+          </p:cNvSpPr>
+          <p:nvPr>
+            <p:ph type="title"/>
+          </p:nvPr>
+        </p:nvSpPr>
+        <p:spPr>
+          <a:xfrm>
+            <a:off x="623888" y="1282303"/>
+            <a:ext cx="7886700" cy="2139553"/>
+          </a:xfrm>
+        </p:spPr>
+        <p:txBody>
+          <a:bodyPr/>
+          <a:lstStyle>
+            <a:lvl1pPr>
+              <a:defRPr sz="2250"/>
+            </a:lvl1pPr>
+          </a:lstStyle>
+          <a:p>
+            <a:r>
+              <a:rPr lang="en-US" smtClean="0"/>
+              <a:t>Click to edit Master title style</a:t>
+            </a:r>
+            <a:endParaRPr lang="en-US"/>
+          </a:p>
+        </p:txBody>
+      </p:sp>
+      <p:sp>
+        <p:nvSpPr>
+          <p:cNvPr id="3" name="Text Placeholder 2"/>
+          <p:cNvSpPr>
+            <a:spLocks noGrp="1"/>
+          </p:cNvSpPr>
+          <p:nvPr>
+            <p:ph type="body" idx="1"/>
+          </p:nvPr>
+        </p:nvSpPr>
+        <p:spPr>
+          <a:xfrm>
+            <a:off x="623888" y="3442097"/>
+            <a:ext cx="7886700" cy="1125141"/>
+          </a:xfrm>
+        </p:spPr>
+        <p:txBody>
+          <a:bodyPr/>
+          <a:lstStyle>
+            <a:lvl1pPr marL="0" indent="0">
+              <a:buNone/>
+              <a:defRPr sz="900"/>
+            </a:lvl1pPr>
+            <a:lvl2pPr marL="171450" indent="0">
+              <a:buNone/>
+              <a:defRPr sz="750"/>
+            </a:lvl2pPr>
+            <a:lvl3pPr marL="342900" indent="0">
+              <a:buNone/>
+              <a:defRPr sz="675"/>
+            </a:lvl3pPr>
+            <a:lvl4pPr marL="514350" indent="0">
+              <a:buNone/>
+              <a:defRPr sz="600"/>
+            </a:lvl4pPr>
+            <a:lvl5pPr marL="685800" indent="0">
+              <a:buNone/>
+              <a:defRPr sz="600"/>
+            </a:lvl5pPr>
+            <a:lvl6pPr marL="857250" indent="0">
+              <a:buNone/>
+              <a:defRPr sz="600"/>
+            </a:lvl6pPr>
+            <a:lvl7pPr marL="1028700" indent="0">
+              <a:buNone/>
+              <a:defRPr sz="600"/>
+            </a:lvl7pPr>
+            <a:lvl8pPr marL="1200150" indent="0">
+              <a:buNone/>
+              <a:defRPr sz="600"/>
+            </a:lvl8pPr>
+            <a:lvl9pPr marL="1371600" indent="0">
+              <a:buNone/>
+              <a:defRPr sz="600"/>
+            </a:lvl9pPr>
+          </a:lstStyle>
+          <a:p>
+            <a:pPr lvl="0"/>
+            <a:r>
+              <a:rPr lang="en-US" smtClean="0"/>
+              <a:t>Click to edit Master text styles</a:t>
+            </a:r>
+          </a:p>
+        </p:txBody>
+      </p:sp>
+    </p:spTree>
+    <p:extLst>
+      <p:ext uri="{BB962C8B-B14F-4D97-AF65-F5344CB8AC3E}">
+        <p14:creationId xmlns:p14="http://schemas.microsoft.com/office/powerpoint/2010/main" val="1763780492"/>
+      </p:ext>
+    </p:extLst>
+  </p:cSld>
+  <p:clrMapOvr>
+    <a:masterClrMapping/>
+  </p:clrMapOvr>
+</p:sldLayout>
+</file>
+
+<file path=ppt/slideLayouts/slideLayout7.xml><?xml version="1.0" encoding="utf-8"?>
+<p:sldLayout xmlns:a="http://schemas.openxmlformats.org/drawingml/2006/main" xmlns:r="http://schemas.openxmlformats.org/officeDocument/2006/relationships" xmlns:p="http://schemas.openxmlformats.org/presentationml/2006/main" type="twoObj" preserve="1">
+  <p:cSld name="Two Content">
+    <p:spTree>
+      <p:nvGrpSpPr>
+        <p:cNvPr id="1" name=""/>
+        <p:cNvGrpSpPr/>
+        <p:nvPr/>
+      </p:nvGrpSpPr>
+      <p:grpSpPr>
+        <a:xfrm>
+          <a:off x="0" y="0"/>
+          <a:ext cx="0" cy="0"/>
+          <a:chOff x="0" y="0"/>
+          <a:chExt cx="0" cy="0"/>
+        </a:xfrm>
+      </p:grpSpPr>
+      <p:sp>
+        <p:nvSpPr>
+          <p:cNvPr id="2" name="Title 1"/>
+          <p:cNvSpPr>
+            <a:spLocks noGrp="1"/>
+          </p:cNvSpPr>
+          <p:nvPr>
+            <p:ph type="title"/>
+          </p:nvPr>
+        </p:nvSpPr>
+        <p:spPr/>
+        <p:txBody>
+          <a:bodyPr/>
+          <a:lstStyle/>
+          <a:p>
+            <a:r>
+              <a:rPr lang="en-US" smtClean="0"/>
+              <a:t>Click to edit Master title style</a:t>
+            </a:r>
+            <a:endParaRPr lang="en-US"/>
+          </a:p>
+        </p:txBody>
+      </p:sp>
+      <p:sp>
+        <p:nvSpPr>
+          <p:cNvPr id="3" name="Content Placeholder 2"/>
+          <p:cNvSpPr>
+            <a:spLocks noGrp="1"/>
+          </p:cNvSpPr>
+          <p:nvPr>
+            <p:ph sz="half" idx="1"/>
+          </p:nvPr>
+        </p:nvSpPr>
+        <p:spPr>
+          <a:xfrm>
+            <a:off x="1812727" y="2652117"/>
+            <a:ext cx="2730698" cy="595908"/>
+          </a:xfrm>
+        </p:spPr>
+        <p:txBody>
+          <a:bodyPr/>
+          <a:lstStyle/>
+          <a:p>
+            <a:pPr lvl="0"/>
+            <a:r>
+              <a:rPr lang="en-US" smtClean="0"/>
+              <a:t>Click to edit Master text styles</a:t>
+            </a:r>
+          </a:p>
+          <a:p>
+            <a:pPr lvl="1"/>
+            <a:r>
+              <a:rPr lang="en-US" smtClean="0"/>
+              <a:t>Second level</a:t>
+            </a:r>
+          </a:p>
+          <a:p>
+            <a:pPr lvl="2"/>
+            <a:r>
+              <a:rPr lang="en-US" smtClean="0"/>
+              <a:t>Third level</a:t>
+            </a:r>
+          </a:p>
+          <a:p>
+            <a:pPr lvl="3"/>
+            <a:r>
+              <a:rPr lang="en-US" smtClean="0"/>
+              <a:t>Fourth level</a:t>
+            </a:r>
+          </a:p>
+          <a:p>
+            <a:pPr lvl="4"/>
+            <a:r>
+              <a:rPr lang="en-US" smtClean="0"/>
+              <a:t>Fifth level</a:t>
+            </a:r>
+            <a:endParaRPr lang="en-US"/>
+          </a:p>
+        </p:txBody>
+      </p:sp>
+      <p:sp>
+        <p:nvSpPr>
+          <p:cNvPr id="4" name="Content Placeholder 3"/>
+          <p:cNvSpPr>
+            <a:spLocks noGrp="1"/>
+          </p:cNvSpPr>
+          <p:nvPr>
+            <p:ph sz="half" idx="2"/>
+          </p:nvPr>
+        </p:nvSpPr>
+        <p:spPr>
+          <a:xfrm>
+            <a:off x="4600575" y="2652117"/>
+            <a:ext cx="2730699" cy="595908"/>
+          </a:xfrm>
+        </p:spPr>
+        <p:txBody>
+          <a:bodyPr/>
+          <a:lstStyle/>
+          <a:p>
+            <a:pPr lvl="0"/>
+            <a:r>
+              <a:rPr lang="en-US" smtClean="0"/>
+              <a:t>Click to edit Master text styles</a:t>
+            </a:r>
+          </a:p>
+          <a:p>
+            <a:pPr lvl="1"/>
+            <a:r>
+              <a:rPr lang="en-US" smtClean="0"/>
+              <a:t>Second level</a:t>
+            </a:r>
+          </a:p>
+          <a:p>
+            <a:pPr lvl="2"/>
+            <a:r>
+              <a:rPr lang="en-US" smtClean="0"/>
+              <a:t>Third level</a:t>
+            </a:r>
+          </a:p>
+          <a:p>
+            <a:pPr lvl="3"/>
+            <a:r>
+              <a:rPr lang="en-US" smtClean="0"/>
+              <a:t>Fourth level</a:t>
+            </a:r>
+          </a:p>
+          <a:p>
+            <a:pPr lvl="4"/>
+            <a:r>
+              <a:rPr lang="en-US" smtClean="0"/>
+              <a:t>Fifth level</a:t>
+            </a:r>
+            <a:endParaRPr lang="en-US"/>
+          </a:p>
+        </p:txBody>
+      </p:sp>
+    </p:spTree>
+    <p:extLst>
+      <p:ext uri="{BB962C8B-B14F-4D97-AF65-F5344CB8AC3E}">
+        <p14:creationId xmlns:p14="http://schemas.microsoft.com/office/powerpoint/2010/main" val="4204299948"/>
+      </p:ext>
+    </p:extLst>
+  </p:cSld>
+  <p:clrMapOvr>
+    <a:masterClrMapping/>
+  </p:clrMapOvr>
+</p:sldLayout>
+</file>
+
+<file path=ppt/slideLayouts/slideLayout8.xml><?xml version="1.0" encoding="utf-8"?>
+<p:sldLayout xmlns:a="http://schemas.openxmlformats.org/drawingml/2006/main" xmlns:r="http://schemas.openxmlformats.org/officeDocument/2006/relationships" xmlns:p="http://schemas.openxmlformats.org/presentationml/2006/main" type="twoTxTwoObj" preserve="1">
+  <p:cSld name="Comparison">
+    <p:spTree>
+      <p:nvGrpSpPr>
+        <p:cNvPr id="1" name=""/>
+        <p:cNvGrpSpPr/>
+        <p:nvPr/>
+      </p:nvGrpSpPr>
+      <p:grpSpPr>
+        <a:xfrm>
+          <a:off x="0" y="0"/>
+          <a:ext cx="0" cy="0"/>
+          <a:chOff x="0" y="0"/>
+          <a:chExt cx="0" cy="0"/>
+        </a:xfrm>
+      </p:grpSpPr>
+      <p:sp>
+        <p:nvSpPr>
+          <p:cNvPr id="2" name="Title 1"/>
+          <p:cNvSpPr>
+            <a:spLocks noGrp="1"/>
+          </p:cNvSpPr>
+          <p:nvPr>
+            <p:ph type="title"/>
+          </p:nvPr>
+        </p:nvSpPr>
+        <p:spPr>
+          <a:xfrm>
+            <a:off x="629841" y="273844"/>
+            <a:ext cx="7886700" cy="994172"/>
+          </a:xfrm>
+        </p:spPr>
+        <p:txBody>
+          <a:bodyPr/>
+          <a:lstStyle/>
+          <a:p>
+            <a:r>
+              <a:rPr lang="en-US" smtClean="0"/>
+              <a:t>Click to edit Master title style</a:t>
+            </a:r>
+            <a:endParaRPr lang="en-US"/>
+          </a:p>
+        </p:txBody>
+      </p:sp>
+      <p:sp>
+        <p:nvSpPr>
+          <p:cNvPr id="3" name="Text Placeholder 2"/>
+          <p:cNvSpPr>
+            <a:spLocks noGrp="1"/>
+          </p:cNvSpPr>
+          <p:nvPr>
+            <p:ph type="body" idx="1"/>
+          </p:nvPr>
+        </p:nvSpPr>
+        <p:spPr>
+          <a:xfrm>
+            <a:off x="629841" y="1260872"/>
+            <a:ext cx="3868341" cy="617934"/>
+          </a:xfrm>
+        </p:spPr>
+        <p:txBody>
+          <a:bodyPr anchor="b"/>
+          <a:lstStyle>
+            <a:lvl1pPr marL="0" indent="0">
+              <a:buNone/>
+              <a:defRPr sz="900" b="1"/>
+            </a:lvl1pPr>
+            <a:lvl2pPr marL="171450" indent="0">
+              <a:buNone/>
+              <a:defRPr sz="750" b="1"/>
+            </a:lvl2pPr>
+            <a:lvl3pPr marL="342900" indent="0">
+              <a:buNone/>
+              <a:defRPr sz="675" b="1"/>
+            </a:lvl3pPr>
+            <a:lvl4pPr marL="514350" indent="0">
+              <a:buNone/>
+              <a:defRPr sz="600" b="1"/>
+            </a:lvl4pPr>
+            <a:lvl5pPr marL="685800" indent="0">
+              <a:buNone/>
+              <a:defRPr sz="600" b="1"/>
+            </a:lvl5pPr>
+            <a:lvl6pPr marL="857250" indent="0">
+              <a:buNone/>
+              <a:defRPr sz="600" b="1"/>
+            </a:lvl6pPr>
+            <a:lvl7pPr marL="1028700" indent="0">
+              <a:buNone/>
+              <a:defRPr sz="600" b="1"/>
+            </a:lvl7pPr>
+            <a:lvl8pPr marL="1200150" indent="0">
+              <a:buNone/>
+              <a:defRPr sz="600" b="1"/>
+            </a:lvl8pPr>
+            <a:lvl9pPr marL="1371600" indent="0">
+              <a:buNone/>
+              <a:defRPr sz="600" b="1"/>
+            </a:lvl9pPr>
+          </a:lstStyle>
+          <a:p>
+            <a:pPr lvl="0"/>
+            <a:r>
+              <a:rPr lang="en-US" smtClean="0"/>
+              <a:t>Click to edit Master text styles</a:t>
+            </a:r>
+          </a:p>
+        </p:txBody>
+      </p:sp>
+      <p:sp>
+        <p:nvSpPr>
+          <p:cNvPr id="4" name="Content Placeholder 3"/>
+          <p:cNvSpPr>
+            <a:spLocks noGrp="1"/>
+          </p:cNvSpPr>
+          <p:nvPr>
+            <p:ph sz="half" idx="2"/>
+          </p:nvPr>
+        </p:nvSpPr>
+        <p:spPr>
+          <a:xfrm>
+            <a:off x="629841" y="1878806"/>
+            <a:ext cx="3868341" cy="2763441"/>
+          </a:xfrm>
+        </p:spPr>
+        <p:txBody>
+          <a:bodyPr/>
+          <a:lstStyle/>
+          <a:p>
+            <a:pPr lvl="0"/>
+            <a:r>
+              <a:rPr lang="en-US" smtClean="0"/>
+              <a:t>Click to edit Master text styles</a:t>
+            </a:r>
+          </a:p>
+          <a:p>
+            <a:pPr lvl="1"/>
+            <a:r>
+              <a:rPr lang="en-US" smtClean="0"/>
+              <a:t>Second level</a:t>
+            </a:r>
+          </a:p>
+          <a:p>
+            <a:pPr lvl="2"/>
+            <a:r>
+              <a:rPr lang="en-US" smtClean="0"/>
+              <a:t>Third level</a:t>
+            </a:r>
+          </a:p>
+          <a:p>
+            <a:pPr lvl="3"/>
+            <a:r>
+              <a:rPr lang="en-US" smtClean="0"/>
+              <a:t>Fourth level</a:t>
+            </a:r>
+          </a:p>
+          <a:p>
+            <a:pPr lvl="4"/>
+            <a:r>
+              <a:rPr lang="en-US" smtClean="0"/>
+              <a:t>Fifth level</a:t>
+            </a:r>
+            <a:endParaRPr lang="en-US"/>
+          </a:p>
+        </p:txBody>
+      </p:sp>
+      <p:sp>
+        <p:nvSpPr>
+          <p:cNvPr id="5" name="Text Placeholder 4"/>
+          <p:cNvSpPr>
+            <a:spLocks noGrp="1"/>
+          </p:cNvSpPr>
+          <p:nvPr>
+            <p:ph type="body" sz="quarter" idx="3"/>
+          </p:nvPr>
+        </p:nvSpPr>
+        <p:spPr>
+          <a:xfrm>
+            <a:off x="4629150" y="1260872"/>
+            <a:ext cx="3887391" cy="617934"/>
+          </a:xfrm>
+        </p:spPr>
+        <p:txBody>
+          <a:bodyPr anchor="b"/>
+          <a:lstStyle>
+            <a:lvl1pPr marL="0" indent="0">
+              <a:buNone/>
+              <a:defRPr sz="900" b="1"/>
+            </a:lvl1pPr>
+            <a:lvl2pPr marL="171450" indent="0">
+              <a:buNone/>
+              <a:defRPr sz="750" b="1"/>
+            </a:lvl2pPr>
+            <a:lvl3pPr marL="342900" indent="0">
+              <a:buNone/>
+              <a:defRPr sz="675" b="1"/>
+            </a:lvl3pPr>
+            <a:lvl4pPr marL="514350" indent="0">
+              <a:buNone/>
+              <a:defRPr sz="600" b="1"/>
+            </a:lvl4pPr>
+            <a:lvl5pPr marL="685800" indent="0">
+              <a:buNone/>
+              <a:defRPr sz="600" b="1"/>
+            </a:lvl5pPr>
+            <a:lvl6pPr marL="857250" indent="0">
+              <a:buNone/>
+              <a:defRPr sz="600" b="1"/>
+            </a:lvl6pPr>
+            <a:lvl7pPr marL="1028700" indent="0">
+              <a:buNone/>
+              <a:defRPr sz="600" b="1"/>
+            </a:lvl7pPr>
+            <a:lvl8pPr marL="1200150" indent="0">
+              <a:buNone/>
+              <a:defRPr sz="600" b="1"/>
+            </a:lvl8pPr>
+            <a:lvl9pPr marL="1371600" indent="0">
+              <a:buNone/>
+              <a:defRPr sz="600" b="1"/>
+            </a:lvl9pPr>
+          </a:lstStyle>
+          <a:p>
+            <a:pPr lvl="0"/>
+            <a:r>
+              <a:rPr lang="en-US" smtClean="0"/>
+              <a:t>Click to edit Master text styles</a:t>
+            </a:r>
+          </a:p>
+        </p:txBody>
+      </p:sp>
+      <p:sp>
+        <p:nvSpPr>
+          <p:cNvPr id="6" name="Content Placeholder 5"/>
+          <p:cNvSpPr>
+            <a:spLocks noGrp="1"/>
+          </p:cNvSpPr>
+          <p:nvPr>
+            <p:ph sz="quarter" idx="4"/>
+          </p:nvPr>
+        </p:nvSpPr>
+        <p:spPr>
+          <a:xfrm>
+            <a:off x="4629150" y="1878806"/>
+            <a:ext cx="3887391" cy="2763441"/>
+          </a:xfrm>
+        </p:spPr>
+        <p:txBody>
+          <a:bodyPr/>
+          <a:lstStyle/>
+          <a:p>
+            <a:pPr lvl="0"/>
+            <a:r>
+              <a:rPr lang="en-US" smtClean="0"/>
+              <a:t>Click to edit Master text styles</a:t>
+            </a:r>
+          </a:p>
+          <a:p>
+            <a:pPr lvl="1"/>
+            <a:r>
+              <a:rPr lang="en-US" smtClean="0"/>
+              <a:t>Second level</a:t>
+            </a:r>
+          </a:p>
+          <a:p>
+            <a:pPr lvl="2"/>
+            <a:r>
+              <a:rPr lang="en-US" smtClean="0"/>
+              <a:t>Third level</a:t>
+            </a:r>
+          </a:p>
+          <a:p>
+            <a:pPr lvl="3"/>
+            <a:r>
+              <a:rPr lang="en-US" smtClean="0"/>
+              <a:t>Fourth level</a:t>
+            </a:r>
+          </a:p>
+          <a:p>
+            <a:pPr lvl="4"/>
+            <a:r>
+              <a:rPr lang="en-US" smtClean="0"/>
+              <a:t>Fifth level</a:t>
+            </a:r>
+            <a:endParaRPr lang="en-US"/>
+          </a:p>
+        </p:txBody>
+      </p:sp>
+    </p:spTree>
+    <p:extLst>
+      <p:ext uri="{BB962C8B-B14F-4D97-AF65-F5344CB8AC3E}">
+        <p14:creationId xmlns:p14="http://schemas.microsoft.com/office/powerpoint/2010/main" val="629635094"/>
+      </p:ext>
+    </p:extLst>
+  </p:cSld>
+  <p:clrMapOvr>
+    <a:masterClrMapping/>
+  </p:clrMapOvr>
+</p:sldLayout>
+</file>
+
+<file path=ppt/slideLayouts/slideLayout9.xml><?xml version="1.0" encoding="utf-8"?>
+<p:sldLayout xmlns:a="http://schemas.openxmlformats.org/drawingml/2006/main" xmlns:r="http://schemas.openxmlformats.org/officeDocument/2006/relationships" xmlns:p="http://schemas.openxmlformats.org/presentationml/2006/main" type="titleOnly" preserve="1">
+  <p:cSld name="Title Only">
+    <p:spTree>
+      <p:nvGrpSpPr>
+        <p:cNvPr id="1" name=""/>
+        <p:cNvGrpSpPr/>
+        <p:nvPr/>
+      </p:nvGrpSpPr>
+      <p:grpSpPr>
+        <a:xfrm>
+          <a:off x="0" y="0"/>
+          <a:ext cx="0" cy="0"/>
+          <a:chOff x="0" y="0"/>
+          <a:chExt cx="0" cy="0"/>
+        </a:xfrm>
+      </p:grpSpPr>
+      <p:sp>
+        <p:nvSpPr>
+          <p:cNvPr id="2" name="Title 1"/>
+          <p:cNvSpPr>
+            <a:spLocks noGrp="1"/>
+          </p:cNvSpPr>
+          <p:nvPr>
+            <p:ph type="title"/>
+          </p:nvPr>
+        </p:nvSpPr>
+        <p:spPr/>
+        <p:txBody>
+          <a:bodyPr/>
+          <a:lstStyle/>
+          <a:p>
+            <a:r>
+              <a:rPr lang="en-US" smtClean="0"/>
+              <a:t>Click to edit Master title style</a:t>
+            </a:r>
+            <a:endParaRPr lang="en-US"/>
+          </a:p>
+        </p:txBody>
+      </p:sp>
+    </p:spTree>
+    <p:extLst>
+      <p:ext uri="{BB962C8B-B14F-4D97-AF65-F5344CB8AC3E}">
+        <p14:creationId xmlns:p14="http://schemas.microsoft.com/office/powerpoint/2010/main" val="2108321471"/>
+      </p:ext>
+    </p:extLst>
+  </p:cSld>
+  <p:clrMapOvr>
+    <a:masterClrMapping/>
+  </p:clrMapOvr>
+</p:sldLayout>
+</file>
+
 <file path=ppt/slideMasters/slideMaster1.xml><?xml version="1.0" encoding="utf-8"?>
 <p:sldMaster xmlns:a="http://schemas.openxmlformats.org/drawingml/2006/main" xmlns:r="http://schemas.openxmlformats.org/officeDocument/2006/relationships" xmlns:p="http://schemas.openxmlformats.org/presentationml/2006/main" preserve="1">
   <p:cSld>
@@ -1210,7 +2745,7 @@
           <a:p>
             <a:fld id="{2EE31933-6E70-4AFA-AB04-85E43741FC5F}" type="datetimeFigureOut">
               <a:rPr lang="en-US" smtClean="0"/>
-              <a:t>5/6/2014</a:t>
+              <a:t>5/7/2014</a:t>
             </a:fld>
             <a:endParaRPr lang="en-US"/>
           </a:p>
@@ -1706,7 +3241,7 @@
           <a:p>
             <a:fld id="{8EDBE830-22A8-47E2-9905-719E7398CD17}" type="datetimeFigureOut">
               <a:rPr lang="en-US" smtClean="0"/>
-              <a:t>5/6/2014</a:t>
+              <a:t>5/7/2014</a:t>
             </a:fld>
             <a:endParaRPr lang="en-US"/>
           </a:p>
@@ -2079,6 +3614,644 @@
 </p:sldMaster>
 </file>
 
+<file path=ppt/slideMasters/slideMaster3.xml><?xml version="1.0" encoding="utf-8"?>
+<p:sldMaster xmlns:a="http://schemas.openxmlformats.org/drawingml/2006/main" xmlns:r="http://schemas.openxmlformats.org/officeDocument/2006/relationships" xmlns:p="http://schemas.openxmlformats.org/presentationml/2006/main">
+  <p:cSld>
+    <p:bg bwMode="auto">
+      <p:bgPr>
+        <a:solidFill>
+          <a:srgbClr val="F5F3EB"/>
+        </a:solidFill>
+        <a:effectLst/>
+      </p:bgPr>
+    </p:bg>
+    <p:spTree>
+      <p:nvGrpSpPr>
+        <p:cNvPr id="1" name=""/>
+        <p:cNvGrpSpPr/>
+        <p:nvPr/>
+      </p:nvGrpSpPr>
+      <p:grpSpPr>
+        <a:xfrm>
+          <a:off x="0" y="0"/>
+          <a:ext cx="0" cy="0"/>
+          <a:chOff x="0" y="0"/>
+          <a:chExt cx="0" cy="0"/>
+        </a:xfrm>
+      </p:grpSpPr>
+      <p:sp>
+        <p:nvSpPr>
+          <p:cNvPr id="1025" name="Rectangle 1"/>
+          <p:cNvSpPr>
+            <a:spLocks/>
+          </p:cNvSpPr>
+          <p:nvPr>
+            <p:ph type="title"/>
+          </p:nvPr>
+        </p:nvSpPr>
+        <p:spPr bwMode="auto">
+          <a:xfrm>
+            <a:off x="1812727" y="863799"/>
+            <a:ext cx="5518547" cy="1741289"/>
+          </a:xfrm>
+          <a:prstGeom prst="rect">
+            <a:avLst/>
+          </a:prstGeom>
+          <a:noFill/>
+          <a:ln>
+            <a:noFill/>
+          </a:ln>
+          <a:effectLst/>
+          <a:extLst>
+            <a:ext uri="{909E8E84-426E-40DD-AFC4-6F175D3DCCD1}">
+              <a14:hiddenFill xmlns:a14="http://schemas.microsoft.com/office/drawing/2010/main">
+                <a:solidFill>
+                  <a:srgbClr val="FFFFFF"/>
+                </a:solidFill>
+              </a14:hiddenFill>
+            </a:ext>
+            <a:ext uri="{91240B29-F687-4F45-9708-019B960494DF}">
+              <a14:hiddenLine xmlns:a14="http://schemas.microsoft.com/office/drawing/2010/main" w="12700" cap="flat" cmpd="sng">
+                <a:solidFill>
+                  <a:srgbClr val="000000"/>
+                </a:solidFill>
+                <a:prstDash val="solid"/>
+                <a:miter lim="0"/>
+                <a:headEnd/>
+                <a:tailEnd/>
+              </a14:hiddenLine>
+            </a:ext>
+            <a:ext uri="{AF507438-7753-43E0-B8FC-AC1667EBCBE1}">
+              <a14:hiddenEffects xmlns:a14="http://schemas.microsoft.com/office/drawing/2010/main">
+                <a:effectLst>
+                  <a:outerShdw dist="35921" dir="2700000" algn="ctr" rotWithShape="0">
+                    <a:srgbClr val="808080"/>
+                  </a:outerShdw>
+                </a:effectLst>
+              </a14:hiddenEffects>
+            </a:ext>
+          </a:extLst>
+        </p:spPr>
+        <p:txBody>
+          <a:bodyPr vert="horz" wrap="square" lIns="0" tIns="0" rIns="0" bIns="0" numCol="1" anchor="b" anchorCtr="0" compatLnSpc="1">
+            <a:prstTxWarp prst="textNoShape">
+              <a:avLst/>
+            </a:prstTxWarp>
+          </a:bodyPr>
+          <a:lstStyle/>
+          <a:p>
+            <a:pPr lvl="0"/>
+            <a:r>
+              <a:rPr lang="en-US" altLang="en-US" smtClean="0">
+                <a:sym typeface="Helvetica Light" charset="0"/>
+              </a:rPr>
+              <a:t>Click to edit Master title style</a:t>
+            </a:r>
+          </a:p>
+        </p:txBody>
+      </p:sp>
+      <p:sp>
+        <p:nvSpPr>
+          <p:cNvPr id="1026" name="Rectangle 2"/>
+          <p:cNvSpPr>
+            <a:spLocks/>
+          </p:cNvSpPr>
+          <p:nvPr>
+            <p:ph type="body" idx="1"/>
+          </p:nvPr>
+        </p:nvSpPr>
+        <p:spPr bwMode="auto">
+          <a:xfrm>
+            <a:off x="1812727" y="2652117"/>
+            <a:ext cx="5518547" cy="595908"/>
+          </a:xfrm>
+          <a:prstGeom prst="rect">
+            <a:avLst/>
+          </a:prstGeom>
+          <a:noFill/>
+          <a:ln>
+            <a:noFill/>
+          </a:ln>
+          <a:effectLst/>
+          <a:extLst>
+            <a:ext uri="{909E8E84-426E-40DD-AFC4-6F175D3DCCD1}">
+              <a14:hiddenFill xmlns:a14="http://schemas.microsoft.com/office/drawing/2010/main">
+                <a:solidFill>
+                  <a:srgbClr val="FFFFFF"/>
+                </a:solidFill>
+              </a14:hiddenFill>
+            </a:ext>
+            <a:ext uri="{91240B29-F687-4F45-9708-019B960494DF}">
+              <a14:hiddenLine xmlns:a14="http://schemas.microsoft.com/office/drawing/2010/main" w="12700" cap="flat" cmpd="sng">
+                <a:solidFill>
+                  <a:srgbClr val="000000"/>
+                </a:solidFill>
+                <a:prstDash val="solid"/>
+                <a:miter lim="0"/>
+                <a:headEnd/>
+                <a:tailEnd/>
+              </a14:hiddenLine>
+            </a:ext>
+            <a:ext uri="{AF507438-7753-43E0-B8FC-AC1667EBCBE1}">
+              <a14:hiddenEffects xmlns:a14="http://schemas.microsoft.com/office/drawing/2010/main">
+                <a:effectLst>
+                  <a:outerShdw dist="35921" dir="2700000" algn="ctr" rotWithShape="0">
+                    <a:srgbClr val="808080"/>
+                  </a:outerShdw>
+                </a:effectLst>
+              </a14:hiddenEffects>
+            </a:ext>
+          </a:extLst>
+        </p:spPr>
+        <p:txBody>
+          <a:bodyPr vert="horz" wrap="square" lIns="0" tIns="0" rIns="0" bIns="0" numCol="1" anchor="t" anchorCtr="0" compatLnSpc="1">
+            <a:prstTxWarp prst="textNoShape">
+              <a:avLst/>
+            </a:prstTxWarp>
+          </a:bodyPr>
+          <a:lstStyle/>
+          <a:p>
+            <a:pPr lvl="0"/>
+            <a:r>
+              <a:rPr lang="en-US" altLang="en-US" smtClean="0">
+                <a:sym typeface="Helvetica Light" charset="0"/>
+              </a:rPr>
+              <a:t>Click to edit Master text styles</a:t>
+            </a:r>
+          </a:p>
+          <a:p>
+            <a:pPr lvl="1"/>
+            <a:r>
+              <a:rPr lang="en-US" altLang="en-US" smtClean="0">
+                <a:sym typeface="Helvetica Light" charset="0"/>
+              </a:rPr>
+              <a:t>Second level</a:t>
+            </a:r>
+          </a:p>
+          <a:p>
+            <a:pPr lvl="2"/>
+            <a:r>
+              <a:rPr lang="en-US" altLang="en-US" smtClean="0">
+                <a:sym typeface="Helvetica Light" charset="0"/>
+              </a:rPr>
+              <a:t>Third level</a:t>
+            </a:r>
+          </a:p>
+          <a:p>
+            <a:pPr lvl="3"/>
+            <a:r>
+              <a:rPr lang="en-US" altLang="en-US" smtClean="0">
+                <a:sym typeface="Helvetica Light" charset="0"/>
+              </a:rPr>
+              <a:t>Fourth level</a:t>
+            </a:r>
+          </a:p>
+          <a:p>
+            <a:pPr lvl="4"/>
+            <a:r>
+              <a:rPr lang="en-US" altLang="en-US" smtClean="0">
+                <a:sym typeface="Helvetica Light" charset="0"/>
+              </a:rPr>
+              <a:t>Fifth level</a:t>
+            </a:r>
+          </a:p>
+        </p:txBody>
+      </p:sp>
+    </p:spTree>
+    <p:extLst>
+      <p:ext uri="{BB962C8B-B14F-4D97-AF65-F5344CB8AC3E}">
+        <p14:creationId xmlns:p14="http://schemas.microsoft.com/office/powerpoint/2010/main" val="3682425287"/>
+      </p:ext>
+    </p:extLst>
+  </p:cSld>
+  <p:clrMap bg1="lt1" tx1="dk1" bg2="lt2" tx2="dk2" accent1="accent1" accent2="accent2" accent3="accent3" accent4="accent4" accent5="accent5" accent6="accent6" hlink="hlink" folHlink="folHlink"/>
+  <p:sldLayoutIdLst>
+    <p:sldLayoutId id="2147483666" r:id="rId1"/>
+    <p:sldLayoutId id="2147483667" r:id="rId2"/>
+    <p:sldLayoutId id="2147483668" r:id="rId3"/>
+    <p:sldLayoutId id="2147483669" r:id="rId4"/>
+    <p:sldLayoutId id="2147483670" r:id="rId5"/>
+    <p:sldLayoutId id="2147483671" r:id="rId6"/>
+    <p:sldLayoutId id="2147483672" r:id="rId7"/>
+    <p:sldLayoutId id="2147483673" r:id="rId8"/>
+    <p:sldLayoutId id="2147483674" r:id="rId9"/>
+    <p:sldLayoutId id="2147483675" r:id="rId10"/>
+    <p:sldLayoutId id="2147483676" r:id="rId11"/>
+  </p:sldLayoutIdLst>
+  <p:txStyles>
+    <p:titleStyle>
+      <a:lvl1pPr algn="ctr" defTabSz="219075" rtl="0" fontAlgn="base" hangingPunct="0">
+        <a:spcBef>
+          <a:spcPct val="0"/>
+        </a:spcBef>
+        <a:spcAft>
+          <a:spcPct val="0"/>
+        </a:spcAft>
+        <a:defRPr sz="4200" kern="1200">
+          <a:solidFill>
+            <a:srgbClr val="000000"/>
+          </a:solidFill>
+          <a:latin typeface="+mj-lt"/>
+          <a:ea typeface="+mj-ea"/>
+          <a:cs typeface="+mj-cs"/>
+          <a:sym typeface="Helvetica Light" charset="0"/>
+        </a:defRPr>
+      </a:lvl1pPr>
+      <a:lvl2pPr algn="ctr" defTabSz="219075" rtl="0" fontAlgn="base" hangingPunct="0">
+        <a:spcBef>
+          <a:spcPct val="0"/>
+        </a:spcBef>
+        <a:spcAft>
+          <a:spcPct val="0"/>
+        </a:spcAft>
+        <a:defRPr sz="4200">
+          <a:solidFill>
+            <a:srgbClr val="000000"/>
+          </a:solidFill>
+          <a:latin typeface="Helvetica Light" charset="0"/>
+          <a:ea typeface="Helvetica Light" charset="0"/>
+          <a:cs typeface="Helvetica Light" charset="0"/>
+          <a:sym typeface="Helvetica Light" charset="0"/>
+        </a:defRPr>
+      </a:lvl2pPr>
+      <a:lvl3pPr algn="ctr" defTabSz="219075" rtl="0" fontAlgn="base" hangingPunct="0">
+        <a:spcBef>
+          <a:spcPct val="0"/>
+        </a:spcBef>
+        <a:spcAft>
+          <a:spcPct val="0"/>
+        </a:spcAft>
+        <a:defRPr sz="4200">
+          <a:solidFill>
+            <a:srgbClr val="000000"/>
+          </a:solidFill>
+          <a:latin typeface="Helvetica Light" charset="0"/>
+          <a:ea typeface="Helvetica Light" charset="0"/>
+          <a:cs typeface="Helvetica Light" charset="0"/>
+          <a:sym typeface="Helvetica Light" charset="0"/>
+        </a:defRPr>
+      </a:lvl3pPr>
+      <a:lvl4pPr algn="ctr" defTabSz="219075" rtl="0" fontAlgn="base" hangingPunct="0">
+        <a:spcBef>
+          <a:spcPct val="0"/>
+        </a:spcBef>
+        <a:spcAft>
+          <a:spcPct val="0"/>
+        </a:spcAft>
+        <a:defRPr sz="4200">
+          <a:solidFill>
+            <a:srgbClr val="000000"/>
+          </a:solidFill>
+          <a:latin typeface="Helvetica Light" charset="0"/>
+          <a:ea typeface="Helvetica Light" charset="0"/>
+          <a:cs typeface="Helvetica Light" charset="0"/>
+          <a:sym typeface="Helvetica Light" charset="0"/>
+        </a:defRPr>
+      </a:lvl4pPr>
+      <a:lvl5pPr algn="ctr" defTabSz="219075" rtl="0" fontAlgn="base" hangingPunct="0">
+        <a:spcBef>
+          <a:spcPct val="0"/>
+        </a:spcBef>
+        <a:spcAft>
+          <a:spcPct val="0"/>
+        </a:spcAft>
+        <a:defRPr sz="4200">
+          <a:solidFill>
+            <a:srgbClr val="000000"/>
+          </a:solidFill>
+          <a:latin typeface="Helvetica Light" charset="0"/>
+          <a:ea typeface="Helvetica Light" charset="0"/>
+          <a:cs typeface="Helvetica Light" charset="0"/>
+          <a:sym typeface="Helvetica Light" charset="0"/>
+        </a:defRPr>
+      </a:lvl5pPr>
+      <a:lvl6pPr marL="171450" algn="ctr" defTabSz="219075" rtl="0" fontAlgn="base" hangingPunct="0">
+        <a:spcBef>
+          <a:spcPct val="0"/>
+        </a:spcBef>
+        <a:spcAft>
+          <a:spcPct val="0"/>
+        </a:spcAft>
+        <a:defRPr sz="4200">
+          <a:solidFill>
+            <a:srgbClr val="000000"/>
+          </a:solidFill>
+          <a:latin typeface="Helvetica Light" charset="0"/>
+          <a:ea typeface="Helvetica Light" charset="0"/>
+          <a:cs typeface="Helvetica Light" charset="0"/>
+          <a:sym typeface="Helvetica Light" charset="0"/>
+        </a:defRPr>
+      </a:lvl6pPr>
+      <a:lvl7pPr marL="342900" algn="ctr" defTabSz="219075" rtl="0" fontAlgn="base" hangingPunct="0">
+        <a:spcBef>
+          <a:spcPct val="0"/>
+        </a:spcBef>
+        <a:spcAft>
+          <a:spcPct val="0"/>
+        </a:spcAft>
+        <a:defRPr sz="4200">
+          <a:solidFill>
+            <a:srgbClr val="000000"/>
+          </a:solidFill>
+          <a:latin typeface="Helvetica Light" charset="0"/>
+          <a:ea typeface="Helvetica Light" charset="0"/>
+          <a:cs typeface="Helvetica Light" charset="0"/>
+          <a:sym typeface="Helvetica Light" charset="0"/>
+        </a:defRPr>
+      </a:lvl7pPr>
+      <a:lvl8pPr marL="514350" algn="ctr" defTabSz="219075" rtl="0" fontAlgn="base" hangingPunct="0">
+        <a:spcBef>
+          <a:spcPct val="0"/>
+        </a:spcBef>
+        <a:spcAft>
+          <a:spcPct val="0"/>
+        </a:spcAft>
+        <a:defRPr sz="4200">
+          <a:solidFill>
+            <a:srgbClr val="000000"/>
+          </a:solidFill>
+          <a:latin typeface="Helvetica Light" charset="0"/>
+          <a:ea typeface="Helvetica Light" charset="0"/>
+          <a:cs typeface="Helvetica Light" charset="0"/>
+          <a:sym typeface="Helvetica Light" charset="0"/>
+        </a:defRPr>
+      </a:lvl8pPr>
+      <a:lvl9pPr marL="685800" algn="ctr" defTabSz="219075" rtl="0" fontAlgn="base" hangingPunct="0">
+        <a:spcBef>
+          <a:spcPct val="0"/>
+        </a:spcBef>
+        <a:spcAft>
+          <a:spcPct val="0"/>
+        </a:spcAft>
+        <a:defRPr sz="4200">
+          <a:solidFill>
+            <a:srgbClr val="000000"/>
+          </a:solidFill>
+          <a:latin typeface="Helvetica Light" charset="0"/>
+          <a:ea typeface="Helvetica Light" charset="0"/>
+          <a:cs typeface="Helvetica Light" charset="0"/>
+          <a:sym typeface="Helvetica Light" charset="0"/>
+        </a:defRPr>
+      </a:lvl9pPr>
+    </p:titleStyle>
+    <p:bodyStyle>
+      <a:lvl1pPr algn="l" defTabSz="219075" rtl="0" fontAlgn="base" hangingPunct="0">
+        <a:spcBef>
+          <a:spcPts val="1575"/>
+        </a:spcBef>
+        <a:spcAft>
+          <a:spcPct val="0"/>
+        </a:spcAft>
+        <a:defRPr sz="1875" kern="1200">
+          <a:solidFill>
+            <a:srgbClr val="000000"/>
+          </a:solidFill>
+          <a:latin typeface="+mn-lt"/>
+          <a:ea typeface="+mn-ea"/>
+          <a:cs typeface="+mn-cs"/>
+          <a:sym typeface="Helvetica Light" charset="0"/>
+        </a:defRPr>
+      </a:lvl1pPr>
+      <a:lvl2pPr marL="85725" algn="l" defTabSz="219075" rtl="0" fontAlgn="base" hangingPunct="0">
+        <a:spcBef>
+          <a:spcPts val="1575"/>
+        </a:spcBef>
+        <a:spcAft>
+          <a:spcPct val="0"/>
+        </a:spcAft>
+        <a:defRPr sz="1875" kern="1200">
+          <a:solidFill>
+            <a:srgbClr val="000000"/>
+          </a:solidFill>
+          <a:latin typeface="+mn-lt"/>
+          <a:ea typeface="+mn-ea"/>
+          <a:cs typeface="+mn-cs"/>
+          <a:sym typeface="Helvetica Light" charset="0"/>
+        </a:defRPr>
+      </a:lvl2pPr>
+      <a:lvl3pPr marL="171450" algn="l" defTabSz="219075" rtl="0" fontAlgn="base" hangingPunct="0">
+        <a:spcBef>
+          <a:spcPts val="1575"/>
+        </a:spcBef>
+        <a:spcAft>
+          <a:spcPct val="0"/>
+        </a:spcAft>
+        <a:defRPr sz="1875" kern="1200">
+          <a:solidFill>
+            <a:srgbClr val="000000"/>
+          </a:solidFill>
+          <a:latin typeface="+mn-lt"/>
+          <a:ea typeface="+mn-ea"/>
+          <a:cs typeface="+mn-cs"/>
+          <a:sym typeface="Helvetica Light" charset="0"/>
+        </a:defRPr>
+      </a:lvl3pPr>
+      <a:lvl4pPr marL="257175" algn="l" defTabSz="219075" rtl="0" fontAlgn="base" hangingPunct="0">
+        <a:spcBef>
+          <a:spcPts val="1575"/>
+        </a:spcBef>
+        <a:spcAft>
+          <a:spcPct val="0"/>
+        </a:spcAft>
+        <a:defRPr sz="1875" kern="1200">
+          <a:solidFill>
+            <a:srgbClr val="000000"/>
+          </a:solidFill>
+          <a:latin typeface="+mn-lt"/>
+          <a:ea typeface="+mn-ea"/>
+          <a:cs typeface="+mn-cs"/>
+          <a:sym typeface="Helvetica Light" charset="0"/>
+        </a:defRPr>
+      </a:lvl4pPr>
+      <a:lvl5pPr marL="342900" algn="l" defTabSz="219075" rtl="0" fontAlgn="base" hangingPunct="0">
+        <a:spcBef>
+          <a:spcPts val="1575"/>
+        </a:spcBef>
+        <a:spcAft>
+          <a:spcPct val="0"/>
+        </a:spcAft>
+        <a:defRPr sz="1875" kern="1200">
+          <a:solidFill>
+            <a:srgbClr val="000000"/>
+          </a:solidFill>
+          <a:latin typeface="+mn-lt"/>
+          <a:ea typeface="+mn-ea"/>
+          <a:cs typeface="+mn-cs"/>
+          <a:sym typeface="Helvetica Light" charset="0"/>
+        </a:defRPr>
+      </a:lvl5pPr>
+      <a:lvl6pPr marL="942975" indent="-85725" algn="l" defTabSz="342900" rtl="0" eaLnBrk="1" latinLnBrk="0" hangingPunct="1">
+        <a:lnSpc>
+          <a:spcPct val="90000"/>
+        </a:lnSpc>
+        <a:spcBef>
+          <a:spcPts val="188"/>
+        </a:spcBef>
+        <a:buFont typeface="Arial" panose="020B0604020202020204" pitchFamily="34" charset="0"/>
+        <a:buChar char="•"/>
+        <a:defRPr sz="675" kern="1200">
+          <a:solidFill>
+            <a:schemeClr val="tx1"/>
+          </a:solidFill>
+          <a:latin typeface="+mn-lt"/>
+          <a:ea typeface="+mn-ea"/>
+          <a:cs typeface="+mn-cs"/>
+        </a:defRPr>
+      </a:lvl6pPr>
+      <a:lvl7pPr marL="1114425" indent="-85725" algn="l" defTabSz="342900" rtl="0" eaLnBrk="1" latinLnBrk="0" hangingPunct="1">
+        <a:lnSpc>
+          <a:spcPct val="90000"/>
+        </a:lnSpc>
+        <a:spcBef>
+          <a:spcPts val="188"/>
+        </a:spcBef>
+        <a:buFont typeface="Arial" panose="020B0604020202020204" pitchFamily="34" charset="0"/>
+        <a:buChar char="•"/>
+        <a:defRPr sz="675" kern="1200">
+          <a:solidFill>
+            <a:schemeClr val="tx1"/>
+          </a:solidFill>
+          <a:latin typeface="+mn-lt"/>
+          <a:ea typeface="+mn-ea"/>
+          <a:cs typeface="+mn-cs"/>
+        </a:defRPr>
+      </a:lvl7pPr>
+      <a:lvl8pPr marL="1285875" indent="-85725" algn="l" defTabSz="342900" rtl="0" eaLnBrk="1" latinLnBrk="0" hangingPunct="1">
+        <a:lnSpc>
+          <a:spcPct val="90000"/>
+        </a:lnSpc>
+        <a:spcBef>
+          <a:spcPts val="188"/>
+        </a:spcBef>
+        <a:buFont typeface="Arial" panose="020B0604020202020204" pitchFamily="34" charset="0"/>
+        <a:buChar char="•"/>
+        <a:defRPr sz="675" kern="1200">
+          <a:solidFill>
+            <a:schemeClr val="tx1"/>
+          </a:solidFill>
+          <a:latin typeface="+mn-lt"/>
+          <a:ea typeface="+mn-ea"/>
+          <a:cs typeface="+mn-cs"/>
+        </a:defRPr>
+      </a:lvl8pPr>
+      <a:lvl9pPr marL="1457325" indent="-85725" algn="l" defTabSz="342900" rtl="0" eaLnBrk="1" latinLnBrk="0" hangingPunct="1">
+        <a:lnSpc>
+          <a:spcPct val="90000"/>
+        </a:lnSpc>
+        <a:spcBef>
+          <a:spcPts val="188"/>
+        </a:spcBef>
+        <a:buFont typeface="Arial" panose="020B0604020202020204" pitchFamily="34" charset="0"/>
+        <a:buChar char="•"/>
+        <a:defRPr sz="675" kern="1200">
+          <a:solidFill>
+            <a:schemeClr val="tx1"/>
+          </a:solidFill>
+          <a:latin typeface="+mn-lt"/>
+          <a:ea typeface="+mn-ea"/>
+          <a:cs typeface="+mn-cs"/>
+        </a:defRPr>
+      </a:lvl9pPr>
+    </p:bodyStyle>
+    <p:otherStyle>
+      <a:defPPr>
+        <a:defRPr lang="en-US"/>
+      </a:defPPr>
+      <a:lvl1pPr marL="0" algn="l" defTabSz="342900" rtl="0" eaLnBrk="1" latinLnBrk="0" hangingPunct="1">
+        <a:defRPr sz="675" kern="1200">
+          <a:solidFill>
+            <a:schemeClr val="tx1"/>
+          </a:solidFill>
+          <a:latin typeface="+mn-lt"/>
+          <a:ea typeface="+mn-ea"/>
+          <a:cs typeface="+mn-cs"/>
+        </a:defRPr>
+      </a:lvl1pPr>
+      <a:lvl2pPr marL="171450" algn="l" defTabSz="342900" rtl="0" eaLnBrk="1" latinLnBrk="0" hangingPunct="1">
+        <a:defRPr sz="675" kern="1200">
+          <a:solidFill>
+            <a:schemeClr val="tx1"/>
+          </a:solidFill>
+          <a:latin typeface="+mn-lt"/>
+          <a:ea typeface="+mn-ea"/>
+          <a:cs typeface="+mn-cs"/>
+        </a:defRPr>
+      </a:lvl2pPr>
+      <a:lvl3pPr marL="342900" algn="l" defTabSz="342900" rtl="0" eaLnBrk="1" latinLnBrk="0" hangingPunct="1">
+        <a:defRPr sz="675" kern="1200">
+          <a:solidFill>
+            <a:schemeClr val="tx1"/>
+          </a:solidFill>
+          <a:latin typeface="+mn-lt"/>
+          <a:ea typeface="+mn-ea"/>
+          <a:cs typeface="+mn-cs"/>
+        </a:defRPr>
+      </a:lvl3pPr>
+      <a:lvl4pPr marL="514350" algn="l" defTabSz="342900" rtl="0" eaLnBrk="1" latinLnBrk="0" hangingPunct="1">
+        <a:defRPr sz="675" kern="1200">
+          <a:solidFill>
+            <a:schemeClr val="tx1"/>
+          </a:solidFill>
+          <a:latin typeface="+mn-lt"/>
+          <a:ea typeface="+mn-ea"/>
+          <a:cs typeface="+mn-cs"/>
+        </a:defRPr>
+      </a:lvl4pPr>
+      <a:lvl5pPr marL="685800" algn="l" defTabSz="342900" rtl="0" eaLnBrk="1" latinLnBrk="0" hangingPunct="1">
+        <a:defRPr sz="675" kern="1200">
+          <a:solidFill>
+            <a:schemeClr val="tx1"/>
+          </a:solidFill>
+          <a:latin typeface="+mn-lt"/>
+          <a:ea typeface="+mn-ea"/>
+          <a:cs typeface="+mn-cs"/>
+        </a:defRPr>
+      </a:lvl5pPr>
+      <a:lvl6pPr marL="857250" algn="l" defTabSz="342900" rtl="0" eaLnBrk="1" latinLnBrk="0" hangingPunct="1">
+        <a:defRPr sz="675" kern="1200">
+          <a:solidFill>
+            <a:schemeClr val="tx1"/>
+          </a:solidFill>
+          <a:latin typeface="+mn-lt"/>
+          <a:ea typeface="+mn-ea"/>
+          <a:cs typeface="+mn-cs"/>
+        </a:defRPr>
+      </a:lvl6pPr>
+      <a:lvl7pPr marL="1028700" algn="l" defTabSz="342900" rtl="0" eaLnBrk="1" latinLnBrk="0" hangingPunct="1">
+        <a:defRPr sz="675" kern="1200">
+          <a:solidFill>
+            <a:schemeClr val="tx1"/>
+          </a:solidFill>
+          <a:latin typeface="+mn-lt"/>
+          <a:ea typeface="+mn-ea"/>
+          <a:cs typeface="+mn-cs"/>
+        </a:defRPr>
+      </a:lvl7pPr>
+      <a:lvl8pPr marL="1200150" algn="l" defTabSz="342900" rtl="0" eaLnBrk="1" latinLnBrk="0" hangingPunct="1">
+        <a:defRPr sz="675" kern="1200">
+          <a:solidFill>
+            <a:schemeClr val="tx1"/>
+          </a:solidFill>
+          <a:latin typeface="+mn-lt"/>
+          <a:ea typeface="+mn-ea"/>
+          <a:cs typeface="+mn-cs"/>
+        </a:defRPr>
+      </a:lvl8pPr>
+      <a:lvl9pPr marL="1371600" algn="l" defTabSz="342900" rtl="0" eaLnBrk="1" latinLnBrk="0" hangingPunct="1">
+        <a:defRPr sz="675" kern="1200">
+          <a:solidFill>
+            <a:schemeClr val="tx1"/>
+          </a:solidFill>
+          <a:latin typeface="+mn-lt"/>
+          <a:ea typeface="+mn-ea"/>
+          <a:cs typeface="+mn-cs"/>
+        </a:defRPr>
+      </a:lvl9pPr>
+    </p:otherStyle>
+  </p:txStyles>
+</p:sldMaster>
+</file>
+
 <file path=ppt/slides/slide1.xml><?xml version="1.0" encoding="utf-8"?>
 <p:sld xmlns:a="http://schemas.openxmlformats.org/drawingml/2006/main" xmlns:r="http://schemas.openxmlformats.org/officeDocument/2006/relationships" xmlns:p="http://schemas.openxmlformats.org/presentationml/2006/main">
   <p:cSld>
@@ -2186,7 +4359,6 @@
               <a:rPr lang="en-US" dirty="0" smtClean="0"/>
               <a:t>Madison .NET User Group</a:t>
             </a:r>
-            <a:endParaRPr lang="en-US" dirty="0" smtClean="0"/>
           </a:p>
           <a:p>
             <a:endParaRPr lang="en-US" dirty="0" smtClean="0"/>
@@ -2250,14 +4422,26 @@
           <a:p>
             <a:r>
               <a:rPr lang="en-US" dirty="0" smtClean="0"/>
-              <a:t>Custom Logic</a:t>
-            </a:r>
-          </a:p>
-          <a:p>
-            <a:r>
-              <a:rPr lang="en-US" dirty="0" smtClean="0"/>
-              <a:t>Custom Filter function</a:t>
-            </a:r>
+              <a:t>Order </a:t>
+            </a:r>
+            <a:r>
+              <a:rPr lang="en-US" dirty="0"/>
+              <a:t>By</a:t>
+            </a:r>
+          </a:p>
+          <a:p>
+            <a:pPr lvl="1"/>
+            <a:r>
+              <a:rPr lang="en-US" dirty="0">
+                <a:hlinkClick r:id="rId2"/>
+              </a:rPr>
+              <a:t>http://docs.angularjs.org/api/ng.filter:orderBy</a:t>
+            </a:r>
+            <a:endParaRPr lang="en-US" dirty="0"/>
+          </a:p>
+          <a:p>
+            <a:pPr lvl="1"/>
+            <a:endParaRPr lang="en-US" dirty="0" smtClean="0"/>
           </a:p>
         </p:txBody>
       </p:sp>
@@ -2278,7 +4462,7 @@
           <a:p>
             <a:r>
               <a:rPr lang="en-US" dirty="0" smtClean="0"/>
-              <a:t>Demo 5 – Functions</a:t>
+              <a:t>Demo 4 – order</a:t>
             </a:r>
             <a:endParaRPr lang="en-US" dirty="0"/>
           </a:p>
@@ -2287,7 +4471,7 @@
     </p:spTree>
     <p:extLst>
       <p:ext uri="{BB962C8B-B14F-4D97-AF65-F5344CB8AC3E}">
-        <p14:creationId xmlns:p14="http://schemas.microsoft.com/office/powerpoint/2010/main" val="185142130"/>
+        <p14:creationId xmlns:p14="http://schemas.microsoft.com/office/powerpoint/2010/main" val="2315377052"/>
       </p:ext>
     </p:extLst>
   </p:cSld>
@@ -2338,80 +4522,20 @@
           <a:p>
             <a:r>
               <a:rPr lang="en-US" dirty="0" smtClean="0"/>
-              <a:t>Ng-show/</a:t>
-            </a:r>
-            <a:r>
-              <a:rPr lang="en-US" dirty="0" err="1" smtClean="0"/>
-              <a:t>ng</a:t>
-            </a:r>
-            <a:r>
-              <a:rPr lang="en-US" dirty="0" smtClean="0"/>
-              <a:t>-hide</a:t>
-            </a:r>
-          </a:p>
-          <a:p>
-            <a:pPr lvl="1"/>
-            <a:r>
-              <a:rPr lang="en-US" dirty="0">
-                <a:hlinkClick r:id="rId2"/>
-              </a:rPr>
-              <a:t>http://docs.angularjs.org/api/ng.directive:ngShow</a:t>
-            </a:r>
-            <a:r>
-              <a:rPr lang="en-US" dirty="0" smtClean="0">
-                <a:hlinkClick r:id="rId2"/>
-              </a:rPr>
-              <a:t>#!</a:t>
-            </a:r>
-            <a:endParaRPr lang="en-US" dirty="0" smtClean="0"/>
-          </a:p>
-          <a:p>
-            <a:pPr lvl="1"/>
-            <a:r>
-              <a:rPr lang="en-US" dirty="0">
-                <a:hlinkClick r:id="rId3"/>
-              </a:rPr>
-              <a:t>http://docs.angularjs.org/api/ng.directive:ngHide</a:t>
-            </a:r>
-            <a:endParaRPr lang="en-US" dirty="0" smtClean="0"/>
-          </a:p>
-          <a:p>
-            <a:r>
-              <a:rPr lang="en-US" dirty="0" smtClean="0"/>
-              <a:t>Ng-click</a:t>
-            </a:r>
-          </a:p>
-          <a:p>
-            <a:pPr lvl="1"/>
-            <a:r>
-              <a:rPr lang="en-US" dirty="0">
-                <a:hlinkClick r:id="rId4"/>
-              </a:rPr>
-              <a:t>http://</a:t>
-            </a:r>
-            <a:r>
-              <a:rPr lang="en-US" dirty="0" smtClean="0">
-                <a:hlinkClick r:id="rId4"/>
-              </a:rPr>
-              <a:t>docs.angularjs.org/api/ng.directive:ngClick</a:t>
-            </a:r>
-            <a:endParaRPr lang="en-US" dirty="0" smtClean="0"/>
-          </a:p>
-          <a:p>
-            <a:r>
-              <a:rPr lang="en-US" dirty="0" smtClean="0"/>
-              <a:t>Directives</a:t>
-            </a:r>
-          </a:p>
-          <a:p>
-            <a:pPr lvl="1"/>
-            <a:r>
-              <a:rPr lang="en-US" dirty="0">
-                <a:hlinkClick r:id="rId5"/>
-              </a:rPr>
-              <a:t>http://docs.angularjs.org/api/</a:t>
-            </a:r>
-            <a:endParaRPr lang="en-US" dirty="0"/>
+              <a:t>Custom Logic</a:t>
+            </a:r>
+          </a:p>
+          <a:p>
+            <a:r>
+              <a:rPr lang="en-US" dirty="0" smtClean="0"/>
+              <a:t>Custom Filter function</a:t>
+            </a:r>
+          </a:p>
+          <a:p>
+            <a:r>
+              <a:rPr lang="en-US" dirty="0" smtClean="0"/>
+              <a:t>$log</a:t>
+            </a:r>
           </a:p>
         </p:txBody>
       </p:sp>
@@ -2432,7 +4556,7 @@
           <a:p>
             <a:r>
               <a:rPr lang="en-US" dirty="0" smtClean="0"/>
-              <a:t>Demo 6 - Directives </a:t>
+              <a:t>Demo 5 – Functions</a:t>
             </a:r>
             <a:endParaRPr lang="en-US" dirty="0"/>
           </a:p>
@@ -2441,7 +4565,7 @@
     </p:spTree>
     <p:extLst>
       <p:ext uri="{BB962C8B-B14F-4D97-AF65-F5344CB8AC3E}">
-        <p14:creationId xmlns:p14="http://schemas.microsoft.com/office/powerpoint/2010/main" val="3546779680"/>
+        <p14:creationId xmlns:p14="http://schemas.microsoft.com/office/powerpoint/2010/main" val="185142130"/>
       </p:ext>
     </p:extLst>
   </p:cSld>
@@ -2492,14 +4616,80 @@
           <a:p>
             <a:r>
               <a:rPr lang="en-US" dirty="0" smtClean="0"/>
-              <a:t>Binding Images</a:t>
-            </a:r>
-          </a:p>
-          <a:p>
-            <a:r>
-              <a:rPr lang="en-US" dirty="0" smtClean="0"/>
-              <a:t>And something really cool</a:t>
-            </a:r>
+              <a:t>Ng-show/</a:t>
+            </a:r>
+            <a:r>
+              <a:rPr lang="en-US" dirty="0" err="1" smtClean="0"/>
+              <a:t>ng</a:t>
+            </a:r>
+            <a:r>
+              <a:rPr lang="en-US" dirty="0" smtClean="0"/>
+              <a:t>-hide</a:t>
+            </a:r>
+          </a:p>
+          <a:p>
+            <a:pPr lvl="1"/>
+            <a:r>
+              <a:rPr lang="en-US" dirty="0">
+                <a:hlinkClick r:id="rId2"/>
+              </a:rPr>
+              <a:t>http://docs.angularjs.org/api/ng.directive:ngShow</a:t>
+            </a:r>
+            <a:r>
+              <a:rPr lang="en-US" dirty="0" smtClean="0">
+                <a:hlinkClick r:id="rId2"/>
+              </a:rPr>
+              <a:t>#!</a:t>
+            </a:r>
+            <a:endParaRPr lang="en-US" dirty="0" smtClean="0"/>
+          </a:p>
+          <a:p>
+            <a:pPr lvl="1"/>
+            <a:r>
+              <a:rPr lang="en-US" dirty="0">
+                <a:hlinkClick r:id="rId3"/>
+              </a:rPr>
+              <a:t>http://docs.angularjs.org/api/ng.directive:ngHide</a:t>
+            </a:r>
+            <a:endParaRPr lang="en-US" dirty="0" smtClean="0"/>
+          </a:p>
+          <a:p>
+            <a:r>
+              <a:rPr lang="en-US" dirty="0" smtClean="0"/>
+              <a:t>Ng-click</a:t>
+            </a:r>
+          </a:p>
+          <a:p>
+            <a:pPr lvl="1"/>
+            <a:r>
+              <a:rPr lang="en-US" dirty="0">
+                <a:hlinkClick r:id="rId4"/>
+              </a:rPr>
+              <a:t>http://</a:t>
+            </a:r>
+            <a:r>
+              <a:rPr lang="en-US" dirty="0" smtClean="0">
+                <a:hlinkClick r:id="rId4"/>
+              </a:rPr>
+              <a:t>docs.angularjs.org/api/ng.directive:ngClick</a:t>
+            </a:r>
+            <a:endParaRPr lang="en-US" dirty="0" smtClean="0"/>
+          </a:p>
+          <a:p>
+            <a:r>
+              <a:rPr lang="en-US" dirty="0" smtClean="0"/>
+              <a:t>Directives</a:t>
+            </a:r>
+          </a:p>
+          <a:p>
+            <a:pPr lvl="1"/>
+            <a:r>
+              <a:rPr lang="en-US" dirty="0">
+                <a:hlinkClick r:id="rId5"/>
+              </a:rPr>
+              <a:t>http://docs.angularjs.org/api/</a:t>
+            </a:r>
+            <a:endParaRPr lang="en-US" dirty="0"/>
           </a:p>
         </p:txBody>
       </p:sp>
@@ -2520,7 +4710,7 @@
           <a:p>
             <a:r>
               <a:rPr lang="en-US" dirty="0" smtClean="0"/>
-              <a:t>Demo Lou – A brief Interlude</a:t>
+              <a:t>Demo 6 - Directives </a:t>
             </a:r>
             <a:endParaRPr lang="en-US" dirty="0"/>
           </a:p>
@@ -2529,7 +4719,7 @@
     </p:spTree>
     <p:extLst>
       <p:ext uri="{BB962C8B-B14F-4D97-AF65-F5344CB8AC3E}">
-        <p14:creationId xmlns:p14="http://schemas.microsoft.com/office/powerpoint/2010/main" val="1461776896"/>
+        <p14:creationId xmlns:p14="http://schemas.microsoft.com/office/powerpoint/2010/main" val="3546779680"/>
       </p:ext>
     </p:extLst>
   </p:cSld>
@@ -2580,21 +4770,14 @@
           <a:p>
             <a:r>
               <a:rPr lang="en-US" dirty="0" smtClean="0"/>
-              <a:t>Enable controlling of UX</a:t>
-            </a:r>
-          </a:p>
-          <a:p>
-            <a:r>
-              <a:rPr lang="en-US" dirty="0" smtClean="0"/>
-              <a:t>Separate work large products</a:t>
-            </a:r>
-          </a:p>
-          <a:p>
-            <a:r>
-              <a:rPr lang="en-US"/>
-              <a:t>http://docs.angularjs.org/guide/templates#!</a:t>
-            </a:r>
-            <a:endParaRPr lang="en-US" dirty="0" smtClean="0"/>
+              <a:t>Binding Images</a:t>
+            </a:r>
+          </a:p>
+          <a:p>
+            <a:r>
+              <a:rPr lang="en-US" dirty="0" smtClean="0"/>
+              <a:t>And something really cool</a:t>
+            </a:r>
           </a:p>
         </p:txBody>
       </p:sp>
@@ -2615,7 +4798,7 @@
           <a:p>
             <a:r>
               <a:rPr lang="en-US" dirty="0" smtClean="0"/>
-              <a:t>Demo 8 – Templates</a:t>
+              <a:t>Demo Lou – A brief Interlude</a:t>
             </a:r>
             <a:endParaRPr lang="en-US" dirty="0"/>
           </a:p>
@@ -2624,7 +4807,7 @@
     </p:spTree>
     <p:extLst>
       <p:ext uri="{BB962C8B-B14F-4D97-AF65-F5344CB8AC3E}">
-        <p14:creationId xmlns:p14="http://schemas.microsoft.com/office/powerpoint/2010/main" val="549008580"/>
+        <p14:creationId xmlns:p14="http://schemas.microsoft.com/office/powerpoint/2010/main" val="1461776896"/>
       </p:ext>
     </p:extLst>
   </p:cSld>
@@ -2668,59 +4851,28 @@
             <p:ph type="body" sz="quarter" idx="11"/>
           </p:nvPr>
         </p:nvSpPr>
-        <p:spPr>
-          <a:xfrm>
-            <a:off x="762000" y="1047750"/>
-            <a:ext cx="7620000" cy="3886200"/>
-          </a:xfrm>
-        </p:spPr>
+        <p:spPr/>
         <p:txBody>
           <a:bodyPr/>
           <a:lstStyle/>
           <a:p>
             <a:r>
               <a:rPr lang="en-US" dirty="0" smtClean="0"/>
-              <a:t>Encapsulate logic</a:t>
-            </a:r>
-          </a:p>
-          <a:p>
-            <a:pPr lvl="1"/>
-            <a:r>
-              <a:rPr lang="en-US" dirty="0" smtClean="0"/>
-              <a:t>Linked together via Dependency injection</a:t>
-            </a:r>
-          </a:p>
-          <a:p>
-            <a:pPr lvl="1"/>
-            <a:r>
-              <a:rPr lang="en-US" dirty="0">
-                <a:hlinkClick r:id="rId2"/>
-              </a:rPr>
-              <a:t>http://</a:t>
-            </a:r>
-            <a:r>
-              <a:rPr lang="en-US" dirty="0" smtClean="0">
-                <a:hlinkClick r:id="rId2"/>
-              </a:rPr>
-              <a:t>docs.angularjs.org/guide/dev_guide.services.creating_services</a:t>
+              <a:t>Enable controlling of UX</a:t>
+            </a:r>
+          </a:p>
+          <a:p>
+            <a:r>
+              <a:rPr lang="en-US" dirty="0" smtClean="0"/>
+              <a:t>Separate work large products</a:t>
+            </a:r>
+          </a:p>
+          <a:p>
+            <a:r>
+              <a:rPr lang="en-US"/>
+              <a:t>http://docs.angularjs.org/guide/templates#!</a:t>
             </a:r>
             <a:endParaRPr lang="en-US" dirty="0" smtClean="0"/>
-          </a:p>
-          <a:p>
-            <a:r>
-              <a:rPr lang="en-US" dirty="0" smtClean="0"/>
-              <a:t>Promises - $q</a:t>
-            </a:r>
-          </a:p>
-          <a:p>
-            <a:pPr lvl="1"/>
-            <a:r>
-              <a:rPr lang="en-US" dirty="0">
-                <a:hlinkClick r:id="rId3"/>
-              </a:rPr>
-              <a:t>http://docs.angularjs.org/api/ng.$q</a:t>
-            </a:r>
-            <a:endParaRPr lang="en-US" dirty="0"/>
           </a:p>
         </p:txBody>
       </p:sp>
@@ -2741,7 +4893,7 @@
           <a:p>
             <a:r>
               <a:rPr lang="en-US" dirty="0" smtClean="0"/>
-              <a:t>Demo 9 - Services</a:t>
+              <a:t>Demo 8 – Templates</a:t>
             </a:r>
             <a:endParaRPr lang="en-US" dirty="0"/>
           </a:p>
@@ -2750,7 +4902,7 @@
     </p:spTree>
     <p:extLst>
       <p:ext uri="{BB962C8B-B14F-4D97-AF65-F5344CB8AC3E}">
-        <p14:creationId xmlns:p14="http://schemas.microsoft.com/office/powerpoint/2010/main" val="1850712121"/>
+        <p14:creationId xmlns:p14="http://schemas.microsoft.com/office/powerpoint/2010/main" val="549008580"/>
       </p:ext>
     </p:extLst>
   </p:cSld>
@@ -2794,15 +4946,59 @@
             <p:ph type="body" sz="quarter" idx="11"/>
           </p:nvPr>
         </p:nvSpPr>
-        <p:spPr/>
+        <p:spPr>
+          <a:xfrm>
+            <a:off x="762000" y="1047750"/>
+            <a:ext cx="7620000" cy="3886200"/>
+          </a:xfrm>
+        </p:spPr>
         <p:txBody>
           <a:bodyPr/>
           <a:lstStyle/>
           <a:p>
             <a:r>
               <a:rPr lang="en-US" dirty="0" smtClean="0"/>
-              <a:t>Create new elements!</a:t>
-            </a:r>
+              <a:t>Encapsulate logic</a:t>
+            </a:r>
+          </a:p>
+          <a:p>
+            <a:pPr lvl="1"/>
+            <a:r>
+              <a:rPr lang="en-US" dirty="0" smtClean="0"/>
+              <a:t>Linked together via Dependency injection</a:t>
+            </a:r>
+          </a:p>
+          <a:p>
+            <a:pPr lvl="1"/>
+            <a:r>
+              <a:rPr lang="en-US" dirty="0">
+                <a:hlinkClick r:id="rId2"/>
+              </a:rPr>
+              <a:t>http://</a:t>
+            </a:r>
+            <a:r>
+              <a:rPr lang="en-US" dirty="0" smtClean="0">
+                <a:hlinkClick r:id="rId2"/>
+              </a:rPr>
+              <a:t>docs.angularjs.org/guide/dev_guide.services.creating_services</a:t>
+            </a:r>
+            <a:endParaRPr lang="en-US" dirty="0" smtClean="0"/>
+          </a:p>
+          <a:p>
+            <a:r>
+              <a:rPr lang="en-US" dirty="0" smtClean="0"/>
+              <a:t>Promises - $q</a:t>
+            </a:r>
+          </a:p>
+          <a:p>
+            <a:pPr lvl="1"/>
+            <a:r>
+              <a:rPr lang="en-US" dirty="0">
+                <a:hlinkClick r:id="rId3"/>
+              </a:rPr>
+              <a:t>http://docs.angularjs.org/api/ng.$q</a:t>
+            </a:r>
+            <a:endParaRPr lang="en-US" dirty="0"/>
           </a:p>
         </p:txBody>
       </p:sp>
@@ -2822,12 +5018,8 @@
           <a:lstStyle/>
           <a:p>
             <a:r>
-              <a:rPr lang="en-US" smtClean="0"/>
-              <a:t>Demo 10 </a:t>
-            </a:r>
-            <a:r>
-              <a:rPr lang="en-US" dirty="0" smtClean="0"/>
-              <a:t>– Data binding</a:t>
+              <a:rPr lang="en-US" dirty="0" smtClean="0"/>
+              <a:t>Demo 9 - Services</a:t>
             </a:r>
             <a:endParaRPr lang="en-US" dirty="0"/>
           </a:p>
@@ -2836,7 +5028,7 @@
     </p:spTree>
     <p:extLst>
       <p:ext uri="{BB962C8B-B14F-4D97-AF65-F5344CB8AC3E}">
-        <p14:creationId xmlns:p14="http://schemas.microsoft.com/office/powerpoint/2010/main" val="3873067040"/>
+        <p14:creationId xmlns:p14="http://schemas.microsoft.com/office/powerpoint/2010/main" val="1850712121"/>
       </p:ext>
     </p:extLst>
   </p:cSld>
@@ -2885,10 +5077,10 @@
           <a:bodyPr/>
           <a:lstStyle/>
           <a:p>
-            <a:pPr marL="0" indent="0" algn="ctr">
-              <a:buNone/>
-            </a:pPr>
-            <a:endParaRPr lang="en-US" sz="2800" dirty="0" smtClean="0"/>
+            <a:r>
+              <a:rPr lang="en-US" dirty="0" smtClean="0"/>
+              <a:t>Create new elements!</a:t>
+            </a:r>
           </a:p>
         </p:txBody>
       </p:sp>
@@ -2908,8 +5100,12 @@
           <a:lstStyle/>
           <a:p>
             <a:r>
-              <a:rPr lang="en-US" dirty="0" smtClean="0"/>
-              <a:t>Questions</a:t>
+              <a:rPr lang="en-US" smtClean="0"/>
+              <a:t>Demo 10 </a:t>
+            </a:r>
+            <a:r>
+              <a:rPr lang="en-US" dirty="0" smtClean="0"/>
+              <a:t>– Data binding</a:t>
             </a:r>
             <a:endParaRPr lang="en-US" dirty="0"/>
           </a:p>
@@ -2918,7 +5114,7 @@
     </p:spTree>
     <p:extLst>
       <p:ext uri="{BB962C8B-B14F-4D97-AF65-F5344CB8AC3E}">
-        <p14:creationId xmlns:p14="http://schemas.microsoft.com/office/powerpoint/2010/main" val="804442806"/>
+        <p14:creationId xmlns:p14="http://schemas.microsoft.com/office/powerpoint/2010/main" val="3873067040"/>
       </p:ext>
     </p:extLst>
   </p:cSld>
@@ -2967,66 +5163,39 @@
           <a:bodyPr/>
           <a:lstStyle/>
           <a:p>
-            <a:pPr marL="0" indent="0" algn="ctr">
-              <a:buNone/>
-            </a:pPr>
-            <a:endParaRPr lang="en-US" sz="2800" dirty="0" smtClean="0"/>
-          </a:p>
-          <a:p>
-            <a:pPr marL="0" indent="0" algn="ctr">
-              <a:buNone/>
-            </a:pPr>
-            <a:r>
-              <a:rPr lang="en-US" sz="2800" dirty="0" smtClean="0"/>
-              <a:t>John Ptacek</a:t>
-            </a:r>
-          </a:p>
-          <a:p>
-            <a:pPr marL="0" indent="0" algn="ctr">
-              <a:buNone/>
-            </a:pPr>
-            <a:r>
-              <a:rPr lang="en-US" sz="2800" dirty="0" smtClean="0"/>
-              <a:t>Skyline Technologies www.SkylineTechnologies.com</a:t>
-            </a:r>
-            <a:endParaRPr lang="en-US" sz="2800" dirty="0"/>
-          </a:p>
-          <a:p>
-            <a:pPr marL="0" indent="0" algn="ctr">
-              <a:buNone/>
-            </a:pPr>
-            <a:r>
-              <a:rPr lang="en-US" sz="2800" dirty="0"/>
-              <a:t>jptacek@SkylineTechnologies.com</a:t>
-            </a:r>
-          </a:p>
-          <a:p>
-            <a:pPr marL="0" indent="0" algn="ctr">
-              <a:buNone/>
-            </a:pPr>
-            <a:endParaRPr lang="en-US" sz="2800" dirty="0" smtClean="0"/>
-          </a:p>
-          <a:p>
-            <a:pPr marL="0" indent="0" algn="ctr">
-              <a:buNone/>
-            </a:pPr>
-            <a:r>
-              <a:rPr lang="en-US" sz="2800" dirty="0" smtClean="0"/>
-              <a:t>@</a:t>
-            </a:r>
-            <a:r>
-              <a:rPr lang="en-US" sz="2800" dirty="0" err="1"/>
-              <a:t>jptacek</a:t>
-            </a:r>
-            <a:r>
-              <a:rPr lang="en-US" sz="2800" dirty="0"/>
-              <a:t> / </a:t>
-            </a:r>
-            <a:r>
-              <a:rPr lang="en-US" sz="2800" dirty="0" smtClean="0"/>
-              <a:t>www.jptacek.com</a:t>
-            </a:r>
-            <a:endParaRPr lang="en-US" sz="2800" dirty="0"/>
+            <a:r>
+              <a:rPr lang="en-US" dirty="0" smtClean="0"/>
+              <a:t>Ng-route JavaScript</a:t>
+            </a:r>
+          </a:p>
+          <a:p>
+            <a:r>
+              <a:rPr lang="en-US" dirty="0" smtClean="0"/>
+              <a:t>Dependency Injection</a:t>
+            </a:r>
+          </a:p>
+          <a:p>
+            <a:r>
+              <a:rPr lang="en-US" dirty="0" smtClean="0"/>
+              <a:t>$</a:t>
+            </a:r>
+            <a:r>
+              <a:rPr lang="en-US" dirty="0" err="1" smtClean="0"/>
+              <a:t>routeProvider</a:t>
+            </a:r>
+            <a:r>
+              <a:rPr lang="en-US" dirty="0" smtClean="0"/>
+              <a:t> and route creation</a:t>
+            </a:r>
+          </a:p>
+          <a:p>
+            <a:r>
+              <a:rPr lang="en-US" dirty="0" smtClean="0"/>
+              <a:t>Introduce ng-view</a:t>
+            </a:r>
+          </a:p>
+          <a:p>
+            <a:endParaRPr lang="en-US" dirty="0" smtClean="0"/>
           </a:p>
         </p:txBody>
       </p:sp>
@@ -3047,7 +5216,7 @@
           <a:p>
             <a:r>
               <a:rPr lang="en-US" dirty="0" smtClean="0"/>
-              <a:t>Thank you!!</a:t>
+              <a:t>Demo 11 – Routes</a:t>
             </a:r>
             <a:endParaRPr lang="en-US" dirty="0"/>
           </a:p>
@@ -3056,7 +5225,7 @@
     </p:spTree>
     <p:extLst>
       <p:ext uri="{BB962C8B-B14F-4D97-AF65-F5344CB8AC3E}">
-        <p14:creationId xmlns:p14="http://schemas.microsoft.com/office/powerpoint/2010/main" val="1834641728"/>
+        <p14:creationId xmlns:p14="http://schemas.microsoft.com/office/powerpoint/2010/main" val="1914701397"/>
       </p:ext>
     </p:extLst>
   </p:cSld>
@@ -3070,6 +5239,438 @@
       </p:par>
     </p:tnLst>
   </p:timing>
+</p:sld>
+</file>
+
+<file path=ppt/slides/slide18.xml><?xml version="1.0" encoding="utf-8"?>
+<p:sld xmlns:a="http://schemas.openxmlformats.org/drawingml/2006/main" xmlns:r="http://schemas.openxmlformats.org/officeDocument/2006/relationships" xmlns:p="http://schemas.openxmlformats.org/presentationml/2006/main">
+  <p:cSld>
+    <p:spTree>
+      <p:nvGrpSpPr>
+        <p:cNvPr id="1" name=""/>
+        <p:cNvGrpSpPr/>
+        <p:nvPr/>
+      </p:nvGrpSpPr>
+      <p:grpSpPr>
+        <a:xfrm>
+          <a:off x="0" y="0"/>
+          <a:ext cx="0" cy="0"/>
+          <a:chOff x="0" y="0"/>
+          <a:chExt cx="0" cy="0"/>
+        </a:xfrm>
+      </p:grpSpPr>
+      <p:sp>
+        <p:nvSpPr>
+          <p:cNvPr id="2" name="Text Placeholder 1"/>
+          <p:cNvSpPr>
+            <a:spLocks noGrp="1"/>
+          </p:cNvSpPr>
+          <p:nvPr>
+            <p:ph type="body" sz="quarter" idx="11"/>
+          </p:nvPr>
+        </p:nvSpPr>
+        <p:spPr/>
+        <p:txBody>
+          <a:bodyPr/>
+          <a:lstStyle/>
+          <a:p>
+            <a:pPr marL="0" indent="0" algn="ctr">
+              <a:buNone/>
+            </a:pPr>
+            <a:endParaRPr lang="en-US" sz="2800" dirty="0" smtClean="0"/>
+          </a:p>
+        </p:txBody>
+      </p:sp>
+      <p:sp>
+        <p:nvSpPr>
+          <p:cNvPr id="3" name="Title 2"/>
+          <p:cNvSpPr>
+            <a:spLocks noGrp="1"/>
+          </p:cNvSpPr>
+          <p:nvPr>
+            <p:ph type="title"/>
+          </p:nvPr>
+        </p:nvSpPr>
+        <p:spPr/>
+        <p:txBody>
+          <a:bodyPr/>
+          <a:lstStyle/>
+          <a:p>
+            <a:r>
+              <a:rPr lang="en-US" dirty="0" smtClean="0"/>
+              <a:t>Questions</a:t>
+            </a:r>
+            <a:endParaRPr lang="en-US" dirty="0"/>
+          </a:p>
+        </p:txBody>
+      </p:sp>
+    </p:spTree>
+    <p:extLst>
+      <p:ext uri="{BB962C8B-B14F-4D97-AF65-F5344CB8AC3E}">
+        <p14:creationId xmlns:p14="http://schemas.microsoft.com/office/powerpoint/2010/main" val="804442806"/>
+      </p:ext>
+    </p:extLst>
+  </p:cSld>
+  <p:clrMapOvr>
+    <a:masterClrMapping/>
+  </p:clrMapOvr>
+  <p:timing>
+    <p:tnLst>
+      <p:par>
+        <p:cTn id="1" dur="indefinite" restart="never" nodeType="tmRoot"/>
+      </p:par>
+    </p:tnLst>
+  </p:timing>
+</p:sld>
+</file>
+
+<file path=ppt/slides/slide19.xml><?xml version="1.0" encoding="utf-8"?>
+<p:sld xmlns:a="http://schemas.openxmlformats.org/drawingml/2006/main" xmlns:r="http://schemas.openxmlformats.org/officeDocument/2006/relationships" xmlns:p="http://schemas.openxmlformats.org/presentationml/2006/main">
+  <p:cSld>
+    <p:spTree>
+      <p:nvGrpSpPr>
+        <p:cNvPr id="1" name=""/>
+        <p:cNvGrpSpPr/>
+        <p:nvPr/>
+      </p:nvGrpSpPr>
+      <p:grpSpPr>
+        <a:xfrm>
+          <a:off x="0" y="0"/>
+          <a:ext cx="0" cy="0"/>
+          <a:chOff x="0" y="0"/>
+          <a:chExt cx="0" cy="0"/>
+        </a:xfrm>
+      </p:grpSpPr>
+      <p:sp>
+        <p:nvSpPr>
+          <p:cNvPr id="3073" name="Rectangle 1"/>
+          <p:cNvSpPr>
+            <a:spLocks noChangeArrowheads="1"/>
+          </p:cNvSpPr>
+          <p:nvPr>
+            <p:ph type="title"/>
+          </p:nvPr>
+        </p:nvSpPr>
+        <p:spPr>
+          <a:xfrm>
+            <a:off x="1454349" y="3267075"/>
+            <a:ext cx="1134666" cy="827484"/>
+          </a:xfrm>
+        </p:spPr>
+        <p:txBody>
+          <a:bodyPr/>
+          <a:lstStyle/>
+          <a:p>
+            <a:pPr defTabSz="146447"/>
+            <a:r>
+              <a:rPr lang="en-US" altLang="en-US" sz="1238" b="1" dirty="0">
+                <a:latin typeface="Neutraface Display" charset="0"/>
+                <a:ea typeface="Neutraface Display" charset="0"/>
+                <a:cs typeface="Neutraface Display" charset="0"/>
+                <a:sym typeface="Neutraface Display" charset="0"/>
+              </a:rPr>
+              <a:t>August 11th - 13th</a:t>
+            </a:r>
+            <a:br>
+              <a:rPr lang="en-US" altLang="en-US" sz="1238" b="1" dirty="0">
+                <a:latin typeface="Neutraface Display" charset="0"/>
+                <a:ea typeface="Neutraface Display" charset="0"/>
+                <a:cs typeface="Neutraface Display" charset="0"/>
+                <a:sym typeface="Neutraface Display" charset="0"/>
+              </a:rPr>
+            </a:br>
+            <a:r>
+              <a:rPr lang="en-US" altLang="en-US" sz="3750" dirty="0">
+                <a:latin typeface="Neutraface Display" charset="0"/>
+                <a:ea typeface="Neutraface Display" charset="0"/>
+                <a:cs typeface="Neutraface Display" charset="0"/>
+                <a:sym typeface="Neutraface Display" charset="0"/>
+              </a:rPr>
+              <a:t>2014</a:t>
+            </a:r>
+            <a:endParaRPr lang="en-US" altLang="en-US" dirty="0"/>
+          </a:p>
+        </p:txBody>
+      </p:sp>
+      <p:sp>
+        <p:nvSpPr>
+          <p:cNvPr id="3074" name="Rectangle 2"/>
+          <p:cNvSpPr>
+            <a:spLocks noChangeArrowheads="1"/>
+          </p:cNvSpPr>
+          <p:nvPr>
+            <p:ph type="body" idx="1"/>
+          </p:nvPr>
+        </p:nvSpPr>
+        <p:spPr>
+          <a:xfrm>
+            <a:off x="6428185" y="3474839"/>
+            <a:ext cx="1456134" cy="655439"/>
+          </a:xfrm>
+        </p:spPr>
+        <p:txBody>
+          <a:bodyPr/>
+          <a:lstStyle/>
+          <a:p>
+            <a:pPr algn="ctr">
+              <a:spcBef>
+                <a:spcPct val="0"/>
+              </a:spcBef>
+            </a:pPr>
+            <a:r>
+              <a:rPr lang="en-US" altLang="en-US" sz="1650" b="1">
+                <a:latin typeface="Neutraface Display" charset="0"/>
+                <a:ea typeface="Neutraface Display" charset="0"/>
+                <a:cs typeface="Neutraface Display" charset="0"/>
+                <a:sym typeface="Neutraface Display" charset="0"/>
+              </a:rPr>
+              <a:t>Kalahari Resort</a:t>
+            </a:r>
+            <a:r>
+              <a:rPr lang="en-US" altLang="en-US" sz="1650">
+                <a:latin typeface="Neutraface Display" charset="0"/>
+                <a:ea typeface="Neutraface Display" charset="0"/>
+                <a:cs typeface="Neutraface Display" charset="0"/>
+                <a:sym typeface="Neutraface Display" charset="0"/>
+              </a:rPr>
+              <a:t> </a:t>
+            </a:r>
+          </a:p>
+          <a:p>
+            <a:pPr algn="ctr">
+              <a:spcBef>
+                <a:spcPct val="0"/>
+              </a:spcBef>
+            </a:pPr>
+            <a:r>
+              <a:rPr lang="en-US" altLang="en-US" sz="1650">
+                <a:latin typeface="Neutraface Display" charset="0"/>
+                <a:ea typeface="Neutraface Display" charset="0"/>
+                <a:cs typeface="Neutraface Display" charset="0"/>
+                <a:sym typeface="Neutraface Display" charset="0"/>
+              </a:rPr>
+              <a:t>Wisconsin Dells</a:t>
+            </a:r>
+            <a:endParaRPr lang="en-US" altLang="en-US"/>
+          </a:p>
+        </p:txBody>
+      </p:sp>
+      <p:pic>
+        <p:nvPicPr>
+          <p:cNvPr id="3075" name="Picture 3" descr="colorLogo-small.png"/>
+          <p:cNvPicPr>
+            <a:picLocks noChangeAspect="1"/>
+          </p:cNvPicPr>
+          <p:nvPr/>
+        </p:nvPicPr>
+        <p:blipFill>
+          <a:blip r:embed="rId2" cstate="print">
+            <a:extLst>
+              <a:ext uri="{28A0092B-C50C-407E-A947-70E740481C1C}">
+                <a14:useLocalDpi xmlns:a14="http://schemas.microsoft.com/office/drawing/2010/main" val="0"/>
+              </a:ext>
+            </a:extLst>
+          </a:blip>
+          <a:srcRect/>
+          <a:stretch>
+            <a:fillRect/>
+          </a:stretch>
+        </p:blipFill>
+        <p:spPr bwMode="auto">
+          <a:xfrm>
+            <a:off x="2422922" y="876300"/>
+            <a:ext cx="4297561" cy="3390305"/>
+          </a:xfrm>
+          <a:prstGeom prst="rect">
+            <a:avLst/>
+          </a:prstGeom>
+          <a:noFill/>
+          <a:ln>
+            <a:noFill/>
+          </a:ln>
+          <a:effectLst/>
+          <a:extLst>
+            <a:ext uri="{909E8E84-426E-40DD-AFC4-6F175D3DCCD1}">
+              <a14:hiddenFill xmlns:a14="http://schemas.microsoft.com/office/drawing/2010/main">
+                <a:solidFill>
+                  <a:srgbClr val="FFFFFF"/>
+                </a:solidFill>
+              </a14:hiddenFill>
+            </a:ext>
+            <a:ext uri="{91240B29-F687-4F45-9708-019B960494DF}">
+              <a14:hiddenLine xmlns:a14="http://schemas.microsoft.com/office/drawing/2010/main" w="12700" cap="flat" cmpd="sng">
+                <a:solidFill>
+                  <a:srgbClr val="000000"/>
+                </a:solidFill>
+                <a:prstDash val="solid"/>
+                <a:miter lim="0"/>
+                <a:headEnd type="none" w="med" len="med"/>
+                <a:tailEnd type="none" w="med" len="med"/>
+              </a14:hiddenLine>
+            </a:ext>
+            <a:ext uri="{AF507438-7753-43E0-B8FC-AC1667EBCBE1}">
+              <a14:hiddenEffects xmlns:a14="http://schemas.microsoft.com/office/drawing/2010/main">
+                <a:effectLst>
+                  <a:outerShdw dist="35921" dir="2700000" algn="ctr" rotWithShape="0">
+                    <a:srgbClr val="808080"/>
+                  </a:outerShdw>
+                </a:effectLst>
+              </a14:hiddenEffects>
+            </a:ext>
+          </a:extLst>
+        </p:spPr>
+      </p:pic>
+      <p:sp>
+        <p:nvSpPr>
+          <p:cNvPr id="3076" name="AutoShape 4"/>
+          <p:cNvSpPr>
+            <a:spLocks/>
+          </p:cNvSpPr>
+          <p:nvPr/>
+        </p:nvSpPr>
+        <p:spPr bwMode="auto">
+          <a:xfrm>
+            <a:off x="2693194" y="4484489"/>
+            <a:ext cx="3757017" cy="337542"/>
+          </a:xfrm>
+          <a:custGeom>
+            <a:avLst/>
+            <a:gdLst>
+              <a:gd name="T0" fmla="*/ 10800 w 21600"/>
+              <a:gd name="T1" fmla="*/ 10800 h 21600"/>
+              <a:gd name="T2" fmla="*/ 10800 w 21600"/>
+              <a:gd name="T3" fmla="*/ 10800 h 21600"/>
+              <a:gd name="T4" fmla="*/ 10800 w 21600"/>
+              <a:gd name="T5" fmla="*/ 10800 h 21600"/>
+              <a:gd name="T6" fmla="*/ 10800 w 21600"/>
+              <a:gd name="T7" fmla="*/ 10800 h 21600"/>
+            </a:gdLst>
+            <a:ahLst/>
+            <a:cxnLst>
+              <a:cxn ang="0">
+                <a:pos x="T0" y="T1"/>
+              </a:cxn>
+              <a:cxn ang="0">
+                <a:pos x="T2" y="T3"/>
+              </a:cxn>
+              <a:cxn ang="0">
+                <a:pos x="T4" y="T5"/>
+              </a:cxn>
+              <a:cxn ang="0">
+                <a:pos x="T6" y="T7"/>
+              </a:cxn>
+            </a:cxnLst>
+            <a:rect l="0" t="0" r="r" b="b"/>
+            <a:pathLst>
+              <a:path w="21600" h="21600">
+                <a:moveTo>
+                  <a:pt x="0" y="0"/>
+                </a:moveTo>
+                <a:lnTo>
+                  <a:pt x="21599" y="0"/>
+                </a:lnTo>
+                <a:lnTo>
+                  <a:pt x="21599" y="21599"/>
+                </a:lnTo>
+                <a:lnTo>
+                  <a:pt x="0" y="21599"/>
+                </a:lnTo>
+                <a:close/>
+              </a:path>
+            </a:pathLst>
+          </a:custGeom>
+          <a:noFill/>
+          <a:ln>
+            <a:noFill/>
+          </a:ln>
+          <a:effectLst/>
+          <a:extLst>
+            <a:ext uri="{909E8E84-426E-40DD-AFC4-6F175D3DCCD1}">
+              <a14:hiddenFill xmlns:a14="http://schemas.microsoft.com/office/drawing/2010/main">
+                <a:solidFill>
+                  <a:srgbClr val="FFFFFF"/>
+                </a:solidFill>
+              </a14:hiddenFill>
+            </a:ext>
+            <a:ext uri="{91240B29-F687-4F45-9708-019B960494DF}">
+              <a14:hiddenLine xmlns:a14="http://schemas.microsoft.com/office/drawing/2010/main" w="12700" cap="flat" cmpd="sng">
+                <a:solidFill>
+                  <a:srgbClr val="000000"/>
+                </a:solidFill>
+                <a:prstDash val="solid"/>
+                <a:miter lim="0"/>
+                <a:headEnd/>
+                <a:tailEnd/>
+              </a14:hiddenLine>
+            </a:ext>
+            <a:ext uri="{AF507438-7753-43E0-B8FC-AC1667EBCBE1}">
+              <a14:hiddenEffects xmlns:a14="http://schemas.microsoft.com/office/drawing/2010/main">
+                <a:effectLst>
+                  <a:outerShdw dist="35921" dir="2700000" algn="ctr" rotWithShape="0">
+                    <a:srgbClr val="808080"/>
+                  </a:outerShdw>
+                </a:effectLst>
+              </a14:hiddenEffects>
+            </a:ext>
+          </a:extLst>
+        </p:spPr>
+        <p:txBody>
+          <a:bodyPr lIns="0" tIns="0" rIns="0" bIns="0"/>
+          <a:lstStyle/>
+          <a:p>
+            <a:pPr algn="ctr" defTabSz="219075" fontAlgn="base" hangingPunct="0">
+              <a:spcBef>
+                <a:spcPct val="0"/>
+              </a:spcBef>
+              <a:spcAft>
+                <a:spcPct val="0"/>
+              </a:spcAft>
+            </a:pPr>
+            <a:r>
+              <a:rPr lang="en-US" altLang="en-US" sz="1650">
+                <a:solidFill>
+                  <a:srgbClr val="000000"/>
+                </a:solidFill>
+                <a:latin typeface="Neutraface Display" charset="0"/>
+                <a:ea typeface="Neutraface Display" charset="0"/>
+                <a:cs typeface="Neutraface Display" charset="0"/>
+                <a:sym typeface="Neutraface Display" charset="0"/>
+              </a:rPr>
+              <a:t>http://</a:t>
+            </a:r>
+            <a:r>
+              <a:rPr lang="en-US" altLang="en-US" sz="1650" u="sng">
+                <a:solidFill>
+                  <a:srgbClr val="000000"/>
+                </a:solidFill>
+                <a:latin typeface="Neutraface Display" charset="0"/>
+                <a:ea typeface="Neutraface Display" charset="0"/>
+                <a:cs typeface="Neutraface Display" charset="0"/>
+                <a:sym typeface="Neutraface Display" charset="0"/>
+                <a:hlinkClick r:id="rId3"/>
+              </a:rPr>
+              <a:t>ThatConference.com</a:t>
+            </a:r>
+            <a:endParaRPr lang="en-US" altLang="en-US" sz="1875">
+              <a:solidFill>
+                <a:srgbClr val="000000"/>
+              </a:solidFill>
+              <a:sym typeface="Helvetica Light" charset="0"/>
+            </a:endParaRPr>
+          </a:p>
+        </p:txBody>
+      </p:sp>
+    </p:spTree>
+    <p:extLst>
+      <p:ext uri="{BB962C8B-B14F-4D97-AF65-F5344CB8AC3E}">
+        <p14:creationId xmlns:p14="http://schemas.microsoft.com/office/powerpoint/2010/main" val="2594905511"/>
+      </p:ext>
+    </p:extLst>
+  </p:cSld>
+  <p:clrMapOvr>
+    <a:masterClrMapping/>
+  </p:clrMapOvr>
+  <p:transition spd="med"/>
 </p:sld>
 </file>
 
@@ -3149,6 +5750,144 @@
     <p:extLst>
       <p:ext uri="{BB962C8B-B14F-4D97-AF65-F5344CB8AC3E}">
         <p14:creationId xmlns:p14="http://schemas.microsoft.com/office/powerpoint/2010/main" val="2133107782"/>
+      </p:ext>
+    </p:extLst>
+  </p:cSld>
+  <p:clrMapOvr>
+    <a:masterClrMapping/>
+  </p:clrMapOvr>
+  <p:timing>
+    <p:tnLst>
+      <p:par>
+        <p:cTn id="1" dur="indefinite" restart="never" nodeType="tmRoot"/>
+      </p:par>
+    </p:tnLst>
+  </p:timing>
+</p:sld>
+</file>
+
+<file path=ppt/slides/slide20.xml><?xml version="1.0" encoding="utf-8"?>
+<p:sld xmlns:a="http://schemas.openxmlformats.org/drawingml/2006/main" xmlns:r="http://schemas.openxmlformats.org/officeDocument/2006/relationships" xmlns:p="http://schemas.openxmlformats.org/presentationml/2006/main">
+  <p:cSld>
+    <p:spTree>
+      <p:nvGrpSpPr>
+        <p:cNvPr id="1" name=""/>
+        <p:cNvGrpSpPr/>
+        <p:nvPr/>
+      </p:nvGrpSpPr>
+      <p:grpSpPr>
+        <a:xfrm>
+          <a:off x="0" y="0"/>
+          <a:ext cx="0" cy="0"/>
+          <a:chOff x="0" y="0"/>
+          <a:chExt cx="0" cy="0"/>
+        </a:xfrm>
+      </p:grpSpPr>
+      <p:sp>
+        <p:nvSpPr>
+          <p:cNvPr id="2" name="Text Placeholder 1"/>
+          <p:cNvSpPr>
+            <a:spLocks noGrp="1"/>
+          </p:cNvSpPr>
+          <p:nvPr>
+            <p:ph type="body" sz="quarter" idx="11"/>
+          </p:nvPr>
+        </p:nvSpPr>
+        <p:spPr/>
+        <p:txBody>
+          <a:bodyPr/>
+          <a:lstStyle/>
+          <a:p>
+            <a:pPr marL="0" indent="0" algn="ctr">
+              <a:buNone/>
+            </a:pPr>
+            <a:endParaRPr lang="en-US" sz="2800" dirty="0" smtClean="0"/>
+          </a:p>
+          <a:p>
+            <a:pPr marL="0" indent="0" algn="ctr">
+              <a:buNone/>
+            </a:pPr>
+            <a:r>
+              <a:rPr lang="en-US" sz="2800" dirty="0" smtClean="0"/>
+              <a:t>John Ptacek</a:t>
+            </a:r>
+          </a:p>
+          <a:p>
+            <a:pPr marL="0" indent="0" algn="ctr">
+              <a:buNone/>
+            </a:pPr>
+            <a:r>
+              <a:rPr lang="en-US" sz="2800" dirty="0" smtClean="0"/>
+              <a:t>Skyline Technologies www.SkylineTechnologies.com</a:t>
+            </a:r>
+            <a:endParaRPr lang="en-US" sz="2800" dirty="0"/>
+          </a:p>
+          <a:p>
+            <a:pPr marL="0" indent="0" algn="ctr">
+              <a:buNone/>
+            </a:pPr>
+            <a:r>
+              <a:rPr lang="en-US" sz="2800" dirty="0"/>
+              <a:t>jptacek@SkylineTechnologies.com</a:t>
+            </a:r>
+          </a:p>
+          <a:p>
+            <a:pPr marL="0" indent="0" algn="ctr">
+              <a:buNone/>
+            </a:pPr>
+            <a:endParaRPr lang="en-US" sz="2800" dirty="0" smtClean="0"/>
+          </a:p>
+          <a:p>
+            <a:pPr marL="0" indent="0" algn="ctr">
+              <a:buNone/>
+            </a:pPr>
+            <a:r>
+              <a:rPr lang="en-US" sz="2800" dirty="0" smtClean="0"/>
+              <a:t>@</a:t>
+            </a:r>
+            <a:r>
+              <a:rPr lang="en-US" sz="2800" dirty="0" err="1"/>
+              <a:t>jptacek</a:t>
+            </a:r>
+            <a:r>
+              <a:rPr lang="en-US" sz="2800" dirty="0"/>
+              <a:t> / </a:t>
+            </a:r>
+            <a:r>
+              <a:rPr lang="en-US" sz="2800" dirty="0" smtClean="0"/>
+              <a:t>www.jptacek.com</a:t>
+            </a:r>
+            <a:endParaRPr lang="en-US" sz="2800" dirty="0"/>
+          </a:p>
+        </p:txBody>
+      </p:sp>
+      <p:sp>
+        <p:nvSpPr>
+          <p:cNvPr id="3" name="Title 2"/>
+          <p:cNvSpPr>
+            <a:spLocks noGrp="1"/>
+          </p:cNvSpPr>
+          <p:nvPr>
+            <p:ph type="title"/>
+          </p:nvPr>
+        </p:nvSpPr>
+        <p:spPr/>
+        <p:txBody>
+          <a:bodyPr/>
+          <a:lstStyle/>
+          <a:p>
+            <a:r>
+              <a:rPr lang="en-US" dirty="0" smtClean="0"/>
+              <a:t>Thank you!!</a:t>
+            </a:r>
+            <a:endParaRPr lang="en-US" dirty="0"/>
+          </a:p>
+        </p:txBody>
+      </p:sp>
+    </p:spTree>
+    <p:extLst>
+      <p:ext uri="{BB962C8B-B14F-4D97-AF65-F5344CB8AC3E}">
+        <p14:creationId xmlns:p14="http://schemas.microsoft.com/office/powerpoint/2010/main" val="1834641728"/>
       </p:ext>
     </p:extLst>
   </p:cSld>
@@ -3596,49 +6335,24 @@
             <a:endParaRPr lang="en-US" dirty="0" smtClean="0"/>
           </a:p>
           <a:p>
-            <a:r>
-              <a:rPr lang="en-US" dirty="0" smtClean="0"/>
-              <a:t>Ng-app, </a:t>
-            </a:r>
-            <a:r>
-              <a:rPr lang="en-US" dirty="0" err="1" smtClean="0"/>
-              <a:t>ng</a:t>
-            </a:r>
-            <a:r>
-              <a:rPr lang="en-US" dirty="0" smtClean="0"/>
-              <a:t>-model</a:t>
-            </a:r>
-          </a:p>
-          <a:p>
-            <a:r>
-              <a:rPr lang="en-US" dirty="0" smtClean="0"/>
-              <a:t>Magical {{}}</a:t>
-            </a:r>
-          </a:p>
-          <a:p>
-            <a:r>
-              <a:rPr lang="en-US" dirty="0" smtClean="0"/>
-              <a:t>Filters</a:t>
-            </a:r>
-          </a:p>
-          <a:p>
             <a:pPr lvl="1"/>
             <a:r>
-              <a:rPr lang="en-US" dirty="0">
-                <a:hlinkClick r:id="rId2"/>
-              </a:rPr>
-              <a:t>http://</a:t>
-            </a:r>
-            <a:r>
-              <a:rPr lang="en-US" dirty="0" smtClean="0">
-                <a:hlinkClick r:id="rId2"/>
-              </a:rPr>
-              <a:t>docs.angularjs.org/api/ng#filter</a:t>
-            </a:r>
-            <a:endParaRPr lang="en-US" dirty="0" smtClean="0"/>
+              <a:rPr lang="en-US" dirty="0"/>
+              <a:t>https://angularjs.org/</a:t>
+            </a:r>
+          </a:p>
+          <a:p>
+            <a:r>
+              <a:rPr lang="en-US" dirty="0" smtClean="0"/>
+              <a:t>Bootstrap</a:t>
+            </a:r>
           </a:p>
           <a:p>
             <a:pPr lvl="1"/>
+            <a:r>
+              <a:rPr lang="en-US" dirty="0"/>
+              <a:t>http://getbootstrap.com/</a:t>
+            </a:r>
             <a:endParaRPr lang="en-US" dirty="0" smtClean="0"/>
           </a:p>
         </p:txBody>
@@ -3660,7 +6374,7 @@
           <a:p>
             <a:r>
               <a:rPr lang="en-US" dirty="0" smtClean="0"/>
-              <a:t>Demo 1 - Intro/Data Binding</a:t>
+              <a:t>Demo 0 - Groundwork</a:t>
             </a:r>
             <a:endParaRPr lang="en-US" dirty="0"/>
           </a:p>
@@ -3720,7 +6434,19 @@
           <a:p>
             <a:r>
               <a:rPr lang="en-US" dirty="0" smtClean="0"/>
-              <a:t>Ng-controller</a:t>
+              <a:t>Ng-app, ng-model</a:t>
+            </a:r>
+          </a:p>
+          <a:p>
+            <a:r>
+              <a:rPr lang="en-US" dirty="0" smtClean="0"/>
+              <a:t>Magical {{}}</a:t>
+            </a:r>
+          </a:p>
+          <a:p>
+            <a:r>
+              <a:rPr lang="en-US" dirty="0" smtClean="0"/>
+              <a:t>Filters</a:t>
             </a:r>
           </a:p>
           <a:p>
@@ -3729,35 +6455,19 @@
               <a:rPr lang="en-US" dirty="0">
                 <a:hlinkClick r:id="rId2"/>
               </a:rPr>
-              <a:t>http://docs.angularjs.org/api/ng.$</a:t>
+              <a:t>http://</a:t>
             </a:r>
             <a:r>
               <a:rPr lang="en-US" dirty="0" smtClean="0">
                 <a:hlinkClick r:id="rId2"/>
               </a:rPr>
-              <a:t>controller</a:t>
+              <a:t>docs.angularjs.org/api/ng#filter</a:t>
             </a:r>
             <a:endParaRPr lang="en-US" dirty="0" smtClean="0"/>
           </a:p>
           <a:p>
-            <a:r>
-              <a:rPr lang="en-US" dirty="0" smtClean="0"/>
-              <a:t>Magical $scope</a:t>
-            </a:r>
-          </a:p>
-          <a:p>
             <a:pPr lvl="1"/>
-            <a:r>
-              <a:rPr lang="en-US" dirty="0" smtClean="0"/>
-              <a:t>View model</a:t>
-            </a:r>
-          </a:p>
-          <a:p>
-            <a:pPr lvl="1"/>
-            <a:r>
-              <a:rPr lang="en-US" dirty="0" smtClean="0"/>
-              <a:t>Object context</a:t>
-            </a:r>
+            <a:endParaRPr lang="en-US" dirty="0" smtClean="0"/>
           </a:p>
         </p:txBody>
       </p:sp>
@@ -3778,7 +6488,7 @@
           <a:p>
             <a:r>
               <a:rPr lang="en-US" dirty="0" smtClean="0"/>
-              <a:t>Demo 2 - Controllers</a:t>
+              <a:t>Demo 1 - Intro/Data Binding</a:t>
             </a:r>
             <a:endParaRPr lang="en-US" dirty="0"/>
           </a:p>
@@ -3787,7 +6497,7 @@
     </p:spTree>
     <p:extLst>
       <p:ext uri="{BB962C8B-B14F-4D97-AF65-F5344CB8AC3E}">
-        <p14:creationId xmlns:p14="http://schemas.microsoft.com/office/powerpoint/2010/main" val="1307488684"/>
+        <p14:creationId xmlns:p14="http://schemas.microsoft.com/office/powerpoint/2010/main" val="2646358429"/>
       </p:ext>
     </p:extLst>
   </p:cSld>
@@ -3838,30 +6548,7 @@
           <a:p>
             <a:r>
               <a:rPr lang="en-US" dirty="0" smtClean="0"/>
-              <a:t>Directives</a:t>
-            </a:r>
-          </a:p>
-          <a:p>
-            <a:pPr lvl="1"/>
-            <a:r>
-              <a:rPr lang="en-US" dirty="0" smtClean="0"/>
-              <a:t>HTML Dom markers (attributes, </a:t>
-            </a:r>
-            <a:r>
-              <a:rPr lang="en-US" dirty="0" err="1" smtClean="0"/>
-              <a:t>css</a:t>
-            </a:r>
-            <a:r>
-              <a:rPr lang="en-US" dirty="0" smtClean="0"/>
-              <a:t> class, </a:t>
-            </a:r>
-            <a:r>
-              <a:rPr lang="en-US" dirty="0" err="1" smtClean="0"/>
-              <a:t>etc</a:t>
-            </a:r>
-            <a:r>
-              <a:rPr lang="en-US" dirty="0" smtClean="0"/>
-              <a:t>)</a:t>
+              <a:t>Ng-controller</a:t>
             </a:r>
           </a:p>
           <a:p>
@@ -3870,41 +6557,42 @@
               <a:rPr lang="en-US" dirty="0">
                 <a:hlinkClick r:id="rId2"/>
               </a:rPr>
-              <a:t>http://</a:t>
+              <a:t>http://docs.angularjs.org/api/ng.$</a:t>
             </a:r>
             <a:r>
               <a:rPr lang="en-US" dirty="0" smtClean="0">
                 <a:hlinkClick r:id="rId2"/>
               </a:rPr>
-              <a:t>docs.angularjs.org/guide/directive</a:t>
-            </a:r>
-            <a:r>
-              <a:rPr lang="en-US" dirty="0" smtClean="0"/>
-              <a:t> </a:t>
-            </a:r>
-            <a:endParaRPr lang="en-US" dirty="0"/>
-          </a:p>
-          <a:p>
-            <a:r>
-              <a:rPr lang="en-US" dirty="0" smtClean="0"/>
-              <a:t>Ng-repeat</a:t>
+              <a:t>controller</a:t>
+            </a:r>
+            <a:endParaRPr lang="en-US" dirty="0" smtClean="0"/>
+          </a:p>
+          <a:p>
+            <a:r>
+              <a:rPr lang="en-US" dirty="0" smtClean="0"/>
+              <a:t>Magical $scope</a:t>
             </a:r>
           </a:p>
           <a:p>
             <a:pPr lvl="1"/>
             <a:r>
-              <a:rPr lang="en-US" dirty="0">
-                <a:hlinkClick r:id="rId3"/>
-              </a:rPr>
-              <a:t>http://</a:t>
-            </a:r>
-            <a:r>
-              <a:rPr lang="en-US" dirty="0" smtClean="0">
-                <a:hlinkClick r:id="rId3"/>
-              </a:rPr>
-              <a:t>docs.angularjs.org/api/ng.directive:ngRepeat</a:t>
-            </a:r>
-            <a:endParaRPr lang="en-US" dirty="0" smtClean="0"/>
+              <a:rPr lang="en-US" dirty="0" smtClean="0"/>
+              <a:t>View model</a:t>
+            </a:r>
+          </a:p>
+          <a:p>
+            <a:pPr lvl="1"/>
+            <a:r>
+              <a:rPr lang="en-US" dirty="0" smtClean="0"/>
+              <a:t>Object context</a:t>
+            </a:r>
+          </a:p>
+          <a:p>
+            <a:pPr lvl="1"/>
+            <a:r>
+              <a:rPr lang="en-US" dirty="0" smtClean="0"/>
+              <a:t>Both controllers and directives have access to scope, but not each to other</a:t>
+            </a:r>
           </a:p>
         </p:txBody>
       </p:sp>
@@ -3925,11 +6613,7 @@
           <a:p>
             <a:r>
               <a:rPr lang="en-US" dirty="0" smtClean="0"/>
-              <a:t>Demo 3 –</a:t>
-            </a:r>
-            <a:r>
-              <a:rPr lang="en-US" dirty="0" err="1" smtClean="0"/>
-              <a:t>RepeaT</a:t>
+              <a:t>Demo 2 - Controllers</a:t>
             </a:r>
             <a:endParaRPr lang="en-US" dirty="0"/>
           </a:p>
@@ -3938,7 +6622,7 @@
     </p:spTree>
     <p:extLst>
       <p:ext uri="{BB962C8B-B14F-4D97-AF65-F5344CB8AC3E}">
-        <p14:creationId xmlns:p14="http://schemas.microsoft.com/office/powerpoint/2010/main" val="919005457"/>
+        <p14:creationId xmlns:p14="http://schemas.microsoft.com/office/powerpoint/2010/main" val="1307488684"/>
       </p:ext>
     </p:extLst>
   </p:cSld>
@@ -3989,7 +6673,30 @@
           <a:p>
             <a:r>
               <a:rPr lang="en-US" dirty="0" smtClean="0"/>
-              <a:t>Ng-filter</a:t>
+              <a:t>Directives</a:t>
+            </a:r>
+          </a:p>
+          <a:p>
+            <a:pPr lvl="1"/>
+            <a:r>
+              <a:rPr lang="en-US" dirty="0" smtClean="0"/>
+              <a:t>HTML Dom markers (attributes, </a:t>
+            </a:r>
+            <a:r>
+              <a:rPr lang="en-US" dirty="0" err="1" smtClean="0"/>
+              <a:t>css</a:t>
+            </a:r>
+            <a:r>
+              <a:rPr lang="en-US" dirty="0" smtClean="0"/>
+              <a:t> class, </a:t>
+            </a:r>
+            <a:r>
+              <a:rPr lang="en-US" dirty="0" err="1" smtClean="0"/>
+              <a:t>etc</a:t>
+            </a:r>
+            <a:r>
+              <a:rPr lang="en-US" dirty="0" smtClean="0"/>
+              <a:t>)</a:t>
             </a:r>
           </a:p>
           <a:p>
@@ -4004,32 +6711,51 @@
               <a:rPr lang="en-US" dirty="0" smtClean="0">
                 <a:hlinkClick r:id="rId2"/>
               </a:rPr>
-              <a:t>docs.angularjs.org/api/ng.filter:filter</a:t>
-            </a:r>
-            <a:endParaRPr lang="en-US" dirty="0" smtClean="0"/>
-          </a:p>
-          <a:p>
-            <a:r>
-              <a:rPr lang="en-US" dirty="0" smtClean="0"/>
-              <a:t>Order </a:t>
-            </a:r>
-            <a:r>
-              <a:rPr lang="en-US" dirty="0"/>
-              <a:t>By</a:t>
+              <a:t>docs.angularjs.org/guide/directive</a:t>
+            </a:r>
+            <a:r>
+              <a:rPr lang="en-US" dirty="0" smtClean="0"/>
+              <a:t> </a:t>
+            </a:r>
+            <a:endParaRPr lang="en-US" dirty="0"/>
+          </a:p>
+          <a:p>
+            <a:r>
+              <a:rPr lang="en-US" dirty="0" smtClean="0"/>
+              <a:t>Ng-repeat</a:t>
             </a:r>
           </a:p>
           <a:p>
             <a:pPr lvl="1"/>
             <a:r>
-              <a:rPr lang="en-US" dirty="0">
+              <a:rPr lang="en-US" dirty="0" smtClean="0">
                 <a:hlinkClick r:id="rId3"/>
               </a:rPr>
-              <a:t>http://docs.angularjs.org/api/ng.filter:orderBy</a:t>
+              <a:t>http://docs.angularjs.org/api/ng.directive:ngRepeat</a:t>
             </a:r>
             <a:endParaRPr lang="en-US" dirty="0"/>
           </a:p>
           <a:p>
+            <a:r>
+              <a:rPr lang="en-US" dirty="0" smtClean="0"/>
+              <a:t>Ng-filter</a:t>
+            </a:r>
+            <a:endParaRPr lang="en-US" dirty="0"/>
+          </a:p>
+          <a:p>
             <a:pPr lvl="1"/>
+            <a:r>
+              <a:rPr lang="en-US" dirty="0">
+                <a:hlinkClick r:id="rId4"/>
+              </a:rPr>
+              <a:t>http://docs.angularjs.org/api/ng.filter:filter</a:t>
+            </a:r>
+            <a:endParaRPr lang="en-US" dirty="0"/>
+          </a:p>
+          <a:p>
+            <a:pPr marL="457200" lvl="1" indent="0">
+              <a:buNone/>
+            </a:pPr>
             <a:endParaRPr lang="en-US" dirty="0" smtClean="0"/>
           </a:p>
         </p:txBody>
@@ -4051,7 +6777,11 @@
           <a:p>
             <a:r>
               <a:rPr lang="en-US" dirty="0" smtClean="0"/>
-              <a:t>Demo 4 –Filter and order</a:t>
+              <a:t>Demo 3 –</a:t>
+            </a:r>
+            <a:r>
+              <a:rPr lang="en-US" dirty="0" err="1" smtClean="0"/>
+              <a:t>RepeaT</a:t>
             </a:r>
             <a:endParaRPr lang="en-US" dirty="0"/>
           </a:p>
@@ -4060,7 +6790,7 @@
     </p:spTree>
     <p:extLst>
       <p:ext uri="{BB962C8B-B14F-4D97-AF65-F5344CB8AC3E}">
-        <p14:creationId xmlns:p14="http://schemas.microsoft.com/office/powerpoint/2010/main" val="2315377052"/>
+        <p14:creationId xmlns:p14="http://schemas.microsoft.com/office/powerpoint/2010/main" val="919005457"/>
       </p:ext>
     </p:extLst>
   </p:cSld>
@@ -4658,6 +7388,354 @@
 </file>
 
 <file path=ppt/theme/theme3.xml><?xml version="1.0" encoding="utf-8"?>
+<a:theme xmlns:a="http://schemas.openxmlformats.org/drawingml/2006/main" name="1_Office Theme">
+  <a:themeElements>
+    <a:clrScheme name="">
+      <a:dk1>
+        <a:srgbClr val="000000"/>
+      </a:dk1>
+      <a:lt1>
+        <a:srgbClr val="FFFFFF"/>
+      </a:lt1>
+      <a:dk2>
+        <a:srgbClr val="53585F"/>
+      </a:dk2>
+      <a:lt2>
+        <a:srgbClr val="DCDEE0"/>
+      </a:lt2>
+      <a:accent1>
+        <a:srgbClr val="0365C0"/>
+      </a:accent1>
+      <a:accent2>
+        <a:srgbClr val="00882B"/>
+      </a:accent2>
+      <a:accent3>
+        <a:srgbClr val="FFFFFF"/>
+      </a:accent3>
+      <a:accent4>
+        <a:srgbClr val="000000"/>
+      </a:accent4>
+      <a:accent5>
+        <a:srgbClr val="AAB8DC"/>
+      </a:accent5>
+      <a:accent6>
+        <a:srgbClr val="007B26"/>
+      </a:accent6>
+      <a:hlink>
+        <a:srgbClr val="0000FF"/>
+      </a:hlink>
+      <a:folHlink>
+        <a:srgbClr val="FF00FF"/>
+      </a:folHlink>
+    </a:clrScheme>
+    <a:fontScheme name="Office Theme">
+      <a:majorFont>
+        <a:latin typeface="Helvetica Light"/>
+        <a:ea typeface="Helvetica Light"/>
+        <a:cs typeface="Helvetica Light"/>
+      </a:majorFont>
+      <a:minorFont>
+        <a:latin typeface="Helvetica Light"/>
+        <a:ea typeface="Helvetica Light"/>
+        <a:cs typeface="Helvetica Light"/>
+      </a:minorFont>
+    </a:fontScheme>
+    <a:fmtScheme name="Office">
+      <a:fillStyleLst>
+        <a:solidFill>
+          <a:schemeClr val="phClr"/>
+        </a:solidFill>
+        <a:gradFill rotWithShape="1">
+          <a:gsLst>
+            <a:gs pos="0">
+              <a:schemeClr val="phClr">
+                <a:lumMod val="110000"/>
+                <a:satMod val="105000"/>
+                <a:tint val="67000"/>
+              </a:schemeClr>
+            </a:gs>
+            <a:gs pos="50000">
+              <a:schemeClr val="phClr">
+                <a:lumMod val="105000"/>
+                <a:satMod val="103000"/>
+                <a:tint val="73000"/>
+              </a:schemeClr>
+            </a:gs>
+            <a:gs pos="100000">
+              <a:schemeClr val="phClr">
+                <a:lumMod val="105000"/>
+                <a:satMod val="109000"/>
+                <a:tint val="81000"/>
+              </a:schemeClr>
+            </a:gs>
+          </a:gsLst>
+          <a:lin ang="5400000" scaled="0"/>
+        </a:gradFill>
+        <a:gradFill rotWithShape="1">
+          <a:gsLst>
+            <a:gs pos="0">
+              <a:schemeClr val="phClr">
+                <a:satMod val="103000"/>
+                <a:lumMod val="102000"/>
+                <a:tint val="94000"/>
+              </a:schemeClr>
+            </a:gs>
+            <a:gs pos="50000">
+              <a:schemeClr val="phClr">
+                <a:satMod val="110000"/>
+                <a:lumMod val="100000"/>
+                <a:shade val="100000"/>
+              </a:schemeClr>
+            </a:gs>
+            <a:gs pos="100000">
+              <a:schemeClr val="phClr">
+                <a:lumMod val="99000"/>
+                <a:satMod val="120000"/>
+                <a:shade val="78000"/>
+              </a:schemeClr>
+            </a:gs>
+          </a:gsLst>
+          <a:lin ang="5400000" scaled="0"/>
+        </a:gradFill>
+      </a:fillStyleLst>
+      <a:lnStyleLst>
+        <a:ln w="6350" cap="flat" cmpd="sng" algn="ctr">
+          <a:solidFill>
+            <a:schemeClr val="phClr"/>
+          </a:solidFill>
+          <a:prstDash val="solid"/>
+          <a:miter lim="800000"/>
+        </a:ln>
+        <a:ln w="12700" cap="flat" cmpd="sng" algn="ctr">
+          <a:solidFill>
+            <a:schemeClr val="phClr"/>
+          </a:solidFill>
+          <a:prstDash val="solid"/>
+          <a:miter lim="800000"/>
+        </a:ln>
+        <a:ln w="19050" cap="flat" cmpd="sng" algn="ctr">
+          <a:solidFill>
+            <a:schemeClr val="phClr"/>
+          </a:solidFill>
+          <a:prstDash val="solid"/>
+          <a:miter lim="800000"/>
+        </a:ln>
+      </a:lnStyleLst>
+      <a:effectStyleLst>
+        <a:effectStyle>
+          <a:effectLst/>
+        </a:effectStyle>
+        <a:effectStyle>
+          <a:effectLst/>
+        </a:effectStyle>
+        <a:effectStyle>
+          <a:effectLst>
+            <a:outerShdw blurRad="57150" dist="19050" dir="5400000" algn="ctr" rotWithShape="0">
+              <a:srgbClr val="000000">
+                <a:alpha val="63000"/>
+              </a:srgbClr>
+            </a:outerShdw>
+          </a:effectLst>
+        </a:effectStyle>
+      </a:effectStyleLst>
+      <a:bgFillStyleLst>
+        <a:solidFill>
+          <a:schemeClr val="phClr"/>
+        </a:solidFill>
+        <a:solidFill>
+          <a:schemeClr val="phClr">
+            <a:tint val="95000"/>
+            <a:satMod val="170000"/>
+          </a:schemeClr>
+        </a:solidFill>
+        <a:gradFill rotWithShape="1">
+          <a:gsLst>
+            <a:gs pos="0">
+              <a:schemeClr val="phClr">
+                <a:tint val="93000"/>
+                <a:satMod val="150000"/>
+                <a:shade val="98000"/>
+                <a:lumMod val="102000"/>
+              </a:schemeClr>
+            </a:gs>
+            <a:gs pos="50000">
+              <a:schemeClr val="phClr">
+                <a:tint val="98000"/>
+                <a:satMod val="130000"/>
+                <a:shade val="90000"/>
+                <a:lumMod val="103000"/>
+              </a:schemeClr>
+            </a:gs>
+            <a:gs pos="100000">
+              <a:schemeClr val="phClr">
+                <a:shade val="63000"/>
+                <a:satMod val="120000"/>
+              </a:schemeClr>
+            </a:gs>
+          </a:gsLst>
+          <a:lin ang="5400000" scaled="0"/>
+        </a:gradFill>
+      </a:bgFillStyleLst>
+    </a:fmtScheme>
+  </a:themeElements>
+  <a:objectDefaults>
+    <a:spDef>
+      <a:spPr bwMode="auto">
+        <a:xfrm>
+          <a:off x="0" y="0"/>
+          <a:ext cx="1" cy="1"/>
+        </a:xfrm>
+        <a:custGeom>
+          <a:avLst/>
+          <a:gdLst/>
+          <a:ahLst/>
+          <a:cxnLst/>
+          <a:rect l="0" t="0" r="0" b="0"/>
+          <a:pathLst/>
+        </a:custGeom>
+        <a:blipFill dpi="0" rotWithShape="0">
+          <a:blip xmlns:r="http://schemas.openxmlformats.org/officeDocument/2006/relationships" r:embed="rId1"/>
+          <a:srcRect/>
+          <a:tile tx="0" ty="0" sx="100000" sy="100000" flip="none" algn="tl"/>
+        </a:blipFill>
+        <a:ln w="25400" cap="flat" cmpd="sng" algn="ctr">
+          <a:solidFill>
+            <a:srgbClr val="000000"/>
+          </a:solidFill>
+          <a:prstDash val="solid"/>
+          <a:miter lim="0"/>
+          <a:headEnd type="none" w="med" len="med"/>
+          <a:tailEnd type="none" w="med" len="med"/>
+        </a:ln>
+        <a:effectLst>
+          <a:outerShdw blurRad="50800" dist="25400" dir="5400000" algn="ctr" rotWithShape="0">
+            <a:srgbClr val="000000">
+              <a:alpha val="50000"/>
+            </a:srgbClr>
+          </a:outerShdw>
+        </a:effectLst>
+      </a:spPr>
+      <a:bodyPr vert="horz" wrap="square" lIns="71437" tIns="71437" rIns="71437" bIns="71437" numCol="1" anchor="ctr" anchorCtr="0" compatLnSpc="1">
+        <a:prstTxWarp prst="textNoShape">
+          <a:avLst/>
+        </a:prstTxWarp>
+      </a:bodyPr>
+      <a:lstStyle>
+        <a:defPPr marL="228600" marR="0" indent="0" algn="ctr" defTabSz="584200" rtl="0" eaLnBrk="1" fontAlgn="base" latinLnBrk="0" hangingPunct="0">
+          <a:lnSpc>
+            <a:spcPct val="100000"/>
+          </a:lnSpc>
+          <a:spcBef>
+            <a:spcPct val="0"/>
+          </a:spcBef>
+          <a:spcAft>
+            <a:spcPct val="0"/>
+          </a:spcAft>
+          <a:buClrTx/>
+          <a:buSzTx/>
+          <a:buFontTx/>
+          <a:buNone/>
+          <a:tabLst/>
+          <a:defRPr kumimoji="0" lang="en-US" altLang="en-US" sz="5000" b="0" i="0" u="none" strike="noStrike" cap="none" normalizeH="0" baseline="0" smtClean="0">
+            <a:ln>
+              <a:noFill/>
+            </a:ln>
+            <a:solidFill>
+              <a:srgbClr val="000000"/>
+            </a:solidFill>
+            <a:effectLst/>
+            <a:latin typeface="Helvetica Light" charset="0"/>
+            <a:ea typeface="Helvetica Light" charset="0"/>
+            <a:cs typeface="Helvetica Light" charset="0"/>
+            <a:sym typeface="Helvetica Light" charset="0"/>
+          </a:defRPr>
+        </a:defPPr>
+      </a:lstStyle>
+    </a:spDef>
+    <a:lnDef>
+      <a:spPr bwMode="auto">
+        <a:xfrm>
+          <a:off x="0" y="0"/>
+          <a:ext cx="1" cy="1"/>
+        </a:xfrm>
+        <a:custGeom>
+          <a:avLst/>
+          <a:gdLst/>
+          <a:ahLst/>
+          <a:cxnLst/>
+          <a:rect l="0" t="0" r="0" b="0"/>
+          <a:pathLst/>
+        </a:custGeom>
+        <a:blipFill dpi="0" rotWithShape="0">
+          <a:blip xmlns:r="http://schemas.openxmlformats.org/officeDocument/2006/relationships" r:embed="rId1"/>
+          <a:srcRect/>
+          <a:tile tx="0" ty="0" sx="100000" sy="100000" flip="none" algn="tl"/>
+        </a:blipFill>
+        <a:ln w="25400" cap="flat" cmpd="sng" algn="ctr">
+          <a:solidFill>
+            <a:srgbClr val="000000"/>
+          </a:solidFill>
+          <a:prstDash val="solid"/>
+          <a:miter lim="0"/>
+          <a:headEnd type="none" w="med" len="med"/>
+          <a:tailEnd type="none" w="med" len="med"/>
+        </a:ln>
+        <a:effectLst>
+          <a:outerShdw blurRad="50800" dist="25400" dir="5400000" algn="ctr" rotWithShape="0">
+            <a:srgbClr val="000000">
+              <a:alpha val="50000"/>
+            </a:srgbClr>
+          </a:outerShdw>
+        </a:effectLst>
+      </a:spPr>
+      <a:bodyPr vert="horz" wrap="square" lIns="71437" tIns="71437" rIns="71437" bIns="71437" numCol="1" anchor="ctr" anchorCtr="0" compatLnSpc="1">
+        <a:prstTxWarp prst="textNoShape">
+          <a:avLst/>
+        </a:prstTxWarp>
+      </a:bodyPr>
+      <a:lstStyle>
+        <a:defPPr marL="228600" marR="0" indent="0" algn="ctr" defTabSz="584200" rtl="0" eaLnBrk="1" fontAlgn="base" latinLnBrk="0" hangingPunct="0">
+          <a:lnSpc>
+            <a:spcPct val="100000"/>
+          </a:lnSpc>
+          <a:spcBef>
+            <a:spcPct val="0"/>
+          </a:spcBef>
+          <a:spcAft>
+            <a:spcPct val="0"/>
+          </a:spcAft>
+          <a:buClrTx/>
+          <a:buSzTx/>
+          <a:buFontTx/>
+          <a:buNone/>
+          <a:tabLst/>
+          <a:defRPr kumimoji="0" lang="en-US" altLang="en-US" sz="5000" b="0" i="0" u="none" strike="noStrike" cap="none" normalizeH="0" baseline="0" smtClean="0">
+            <a:ln>
+              <a:noFill/>
+            </a:ln>
+            <a:solidFill>
+              <a:srgbClr val="000000"/>
+            </a:solidFill>
+            <a:effectLst/>
+            <a:latin typeface="Helvetica Light" charset="0"/>
+            <a:ea typeface="Helvetica Light" charset="0"/>
+            <a:cs typeface="Helvetica Light" charset="0"/>
+            <a:sym typeface="Helvetica Light" charset="0"/>
+          </a:defRPr>
+        </a:defPPr>
+      </a:lstStyle>
+    </a:lnDef>
+  </a:objectDefaults>
+  <a:extraClrSchemeLst/>
+  <a:extLst>
+    <a:ext uri="{05A4C25C-085E-4340-85A3-A5531E510DB2}">
+      <thm15:themeFamily xmlns:thm15="http://schemas.microsoft.com/office/thememl/2012/main" name="Office Theme" id="{62F939B6-93AF-4DB8-9C6B-D6C7DFDC589F}" vid="{4A3C46E8-61CC-4603-A589-7422A47A8E4A}"/>
+    </a:ext>
+  </a:extLst>
+</a:theme>
+</file>
+
+<file path=ppt/theme/theme4.xml><?xml version="1.0" encoding="utf-8"?>
 <a:theme xmlns:a="http://schemas.openxmlformats.org/drawingml/2006/main" name="Office Theme">
   <a:themeElements>
     <a:clrScheme name="Office">
@@ -5171,13 +8249,13 @@
 <file path=customXml/itemProps1.xml><?xml version="1.0" encoding="utf-8"?>
 <ds:datastoreItem xmlns:ds="http://schemas.openxmlformats.org/officeDocument/2006/customXml" ds:itemID="{60DB4CE3-4EB9-4C5B-AB3E-621993C78A6D}">
   <ds:schemaRefs>
+    <ds:schemaRef ds:uri="http://schemas.microsoft.com/office/2006/metadata/properties"/>
+    <ds:schemaRef ds:uri="52ad97b0-86c1-49b5-b544-c488bf38e7c0"/>
+    <ds:schemaRef ds:uri="http://purl.org/dc/elements/1.1/"/>
+    <ds:schemaRef ds:uri="http://schemas.openxmlformats.org/package/2006/metadata/core-properties"/>
+    <ds:schemaRef ds:uri="http://purl.org/dc/terms/"/>
+    <ds:schemaRef ds:uri="http://schemas.microsoft.com/office/infopath/2007/PartnerControls"/>
     <ds:schemaRef ds:uri="http://schemas.microsoft.com/office/2006/documentManagement/types"/>
-    <ds:schemaRef ds:uri="http://schemas.openxmlformats.org/package/2006/metadata/core-properties"/>
-    <ds:schemaRef ds:uri="http://purl.org/dc/elements/1.1/"/>
-    <ds:schemaRef ds:uri="http://schemas.microsoft.com/office/infopath/2007/PartnerControls"/>
-    <ds:schemaRef ds:uri="http://schemas.microsoft.com/office/2006/metadata/properties"/>
-    <ds:schemaRef ds:uri="http://purl.org/dc/terms/"/>
-    <ds:schemaRef ds:uri="52ad97b0-86c1-49b5-b544-c488bf38e7c0"/>
     <ds:schemaRef ds:uri="1e37aee8-73ad-441e-bced-8b530ad9291b"/>
     <ds:schemaRef ds:uri="http://www.w3.org/XML/1998/namespace"/>
     <ds:schemaRef ds:uri="http://purl.org/dc/dcmitype/"/>

</xml_diff>